<commit_message>
- fin de la présentation
</commit_message>
<xml_diff>
--- a/Présentation1.pptx
+++ b/Présentation1.pptx
@@ -4,10 +4,23 @@
   <p:sldMasterIdLst>
     <p:sldMasterId id="2147483736" r:id="rId1"/>
   </p:sldMasterIdLst>
+  <p:notesMasterIdLst>
+    <p:notesMasterId r:id="rId15"/>
+  </p:notesMasterIdLst>
   <p:sldIdLst>
     <p:sldId id="256" r:id="rId2"/>
     <p:sldId id="257" r:id="rId3"/>
     <p:sldId id="258" r:id="rId4"/>
+    <p:sldId id="259" r:id="rId5"/>
+    <p:sldId id="260" r:id="rId6"/>
+    <p:sldId id="261" r:id="rId7"/>
+    <p:sldId id="262" r:id="rId8"/>
+    <p:sldId id="263" r:id="rId9"/>
+    <p:sldId id="268" r:id="rId10"/>
+    <p:sldId id="269" r:id="rId11"/>
+    <p:sldId id="265" r:id="rId12"/>
+    <p:sldId id="266" r:id="rId13"/>
+    <p:sldId id="270" r:id="rId14"/>
   </p:sldIdLst>
   <p:sldSz cx="12192000" cy="6858000"/>
   <p:notesSz cx="6858000" cy="9144000"/>
@@ -106,7 +119,445 @@
       </a:defRPr>
     </a:lvl9pPr>
   </p:defaultTextStyle>
+  <p:extLst>
+    <p:ext uri="{EFAFB233-063F-42B5-8137-9DF3F51BA10A}">
+      <p15:sldGuideLst xmlns:p15="http://schemas.microsoft.com/office/powerpoint/2012/main"/>
+    </p:ext>
+  </p:extLst>
 </p:presentation>
+</file>
+
+<file path=ppt/notesMasters/notesMaster1.xml><?xml version="1.0" encoding="utf-8"?>
+<p:notesMaster xmlns:a="http://schemas.openxmlformats.org/drawingml/2006/main" xmlns:r="http://schemas.openxmlformats.org/officeDocument/2006/relationships" xmlns:p="http://schemas.openxmlformats.org/presentationml/2006/main">
+  <p:cSld>
+    <p:bg>
+      <p:bgRef idx="1001">
+        <a:schemeClr val="bg1"/>
+      </p:bgRef>
+    </p:bg>
+    <p:spTree>
+      <p:nvGrpSpPr>
+        <p:cNvPr id="1" name=""/>
+        <p:cNvGrpSpPr/>
+        <p:nvPr/>
+      </p:nvGrpSpPr>
+      <p:grpSpPr>
+        <a:xfrm>
+          <a:off x="0" y="0"/>
+          <a:ext cx="0" cy="0"/>
+          <a:chOff x="0" y="0"/>
+          <a:chExt cx="0" cy="0"/>
+        </a:xfrm>
+      </p:grpSpPr>
+      <p:sp>
+        <p:nvSpPr>
+          <p:cNvPr id="2" name="Espace réservé de l'en-tête 1"/>
+          <p:cNvSpPr>
+            <a:spLocks noGrp="1"/>
+          </p:cNvSpPr>
+          <p:nvPr>
+            <p:ph type="hdr" sz="quarter"/>
+          </p:nvPr>
+        </p:nvSpPr>
+        <p:spPr>
+          <a:xfrm>
+            <a:off x="0" y="0"/>
+            <a:ext cx="2971800" cy="458788"/>
+          </a:xfrm>
+          <a:prstGeom prst="rect">
+            <a:avLst/>
+          </a:prstGeom>
+        </p:spPr>
+        <p:txBody>
+          <a:bodyPr vert="horz" lIns="91440" tIns="45720" rIns="91440" bIns="45720" rtlCol="0"/>
+          <a:lstStyle>
+            <a:lvl1pPr algn="l">
+              <a:defRPr sz="1200"/>
+            </a:lvl1pPr>
+          </a:lstStyle>
+          <a:p>
+            <a:endParaRPr lang="fr-FR"/>
+          </a:p>
+        </p:txBody>
+      </p:sp>
+      <p:sp>
+        <p:nvSpPr>
+          <p:cNvPr id="3" name="Espace réservé de la date 2"/>
+          <p:cNvSpPr>
+            <a:spLocks noGrp="1"/>
+          </p:cNvSpPr>
+          <p:nvPr>
+            <p:ph type="dt" idx="1"/>
+          </p:nvPr>
+        </p:nvSpPr>
+        <p:spPr>
+          <a:xfrm>
+            <a:off x="3884613" y="0"/>
+            <a:ext cx="2971800" cy="458788"/>
+          </a:xfrm>
+          <a:prstGeom prst="rect">
+            <a:avLst/>
+          </a:prstGeom>
+        </p:spPr>
+        <p:txBody>
+          <a:bodyPr vert="horz" lIns="91440" tIns="45720" rIns="91440" bIns="45720" rtlCol="0"/>
+          <a:lstStyle>
+            <a:lvl1pPr algn="r">
+              <a:defRPr sz="1200"/>
+            </a:lvl1pPr>
+          </a:lstStyle>
+          <a:p>
+            <a:fld id="{803C68C2-9692-5C40-ABA6-0581AAF4CC10}" type="datetimeFigureOut">
+              <a:rPr lang="fr-FR" smtClean="0"/>
+              <a:t>03/02/2022</a:t>
+            </a:fld>
+            <a:endParaRPr lang="fr-FR"/>
+          </a:p>
+        </p:txBody>
+      </p:sp>
+      <p:sp>
+        <p:nvSpPr>
+          <p:cNvPr id="4" name="Espace réservé de l'image des diapositives 3"/>
+          <p:cNvSpPr>
+            <a:spLocks noGrp="1" noRot="1" noChangeAspect="1"/>
+          </p:cNvSpPr>
+          <p:nvPr>
+            <p:ph type="sldImg" idx="2"/>
+          </p:nvPr>
+        </p:nvSpPr>
+        <p:spPr>
+          <a:xfrm>
+            <a:off x="685800" y="1143000"/>
+            <a:ext cx="5486400" cy="3086100"/>
+          </a:xfrm>
+          <a:prstGeom prst="rect">
+            <a:avLst/>
+          </a:prstGeom>
+          <a:noFill/>
+          <a:ln w="12700">
+            <a:solidFill>
+              <a:prstClr val="black"/>
+            </a:solidFill>
+          </a:ln>
+        </p:spPr>
+        <p:txBody>
+          <a:bodyPr vert="horz" lIns="91440" tIns="45720" rIns="91440" bIns="45720" rtlCol="0" anchor="ctr"/>
+          <a:lstStyle/>
+          <a:p>
+            <a:endParaRPr lang="fr-FR"/>
+          </a:p>
+        </p:txBody>
+      </p:sp>
+      <p:sp>
+        <p:nvSpPr>
+          <p:cNvPr id="5" name="Espace réservé des notes 4"/>
+          <p:cNvSpPr>
+            <a:spLocks noGrp="1"/>
+          </p:cNvSpPr>
+          <p:nvPr>
+            <p:ph type="body" sz="quarter" idx="3"/>
+          </p:nvPr>
+        </p:nvSpPr>
+        <p:spPr>
+          <a:xfrm>
+            <a:off x="685800" y="4400550"/>
+            <a:ext cx="5486400" cy="3600450"/>
+          </a:xfrm>
+          <a:prstGeom prst="rect">
+            <a:avLst/>
+          </a:prstGeom>
+        </p:spPr>
+        <p:txBody>
+          <a:bodyPr vert="horz" lIns="91440" tIns="45720" rIns="91440" bIns="45720" rtlCol="0"/>
+          <a:lstStyle/>
+          <a:p>
+            <a:pPr lvl="0"/>
+            <a:r>
+              <a:rPr lang="fr-FR"/>
+              <a:t>Cliquez pour modifier les styles du texte du masque</a:t>
+            </a:r>
+          </a:p>
+          <a:p>
+            <a:pPr lvl="1"/>
+            <a:r>
+              <a:rPr lang="fr-FR"/>
+              <a:t>Deuxième niveau</a:t>
+            </a:r>
+          </a:p>
+          <a:p>
+            <a:pPr lvl="2"/>
+            <a:r>
+              <a:rPr lang="fr-FR"/>
+              <a:t>Troisième niveau</a:t>
+            </a:r>
+          </a:p>
+          <a:p>
+            <a:pPr lvl="3"/>
+            <a:r>
+              <a:rPr lang="fr-FR"/>
+              <a:t>Quatrième niveau</a:t>
+            </a:r>
+          </a:p>
+          <a:p>
+            <a:pPr lvl="4"/>
+            <a:r>
+              <a:rPr lang="fr-FR"/>
+              <a:t>Cinquième niveau</a:t>
+            </a:r>
+          </a:p>
+        </p:txBody>
+      </p:sp>
+      <p:sp>
+        <p:nvSpPr>
+          <p:cNvPr id="6" name="Espace réservé du pied de page 5"/>
+          <p:cNvSpPr>
+            <a:spLocks noGrp="1"/>
+          </p:cNvSpPr>
+          <p:nvPr>
+            <p:ph type="ftr" sz="quarter" idx="4"/>
+          </p:nvPr>
+        </p:nvSpPr>
+        <p:spPr>
+          <a:xfrm>
+            <a:off x="0" y="8685213"/>
+            <a:ext cx="2971800" cy="458787"/>
+          </a:xfrm>
+          <a:prstGeom prst="rect">
+            <a:avLst/>
+          </a:prstGeom>
+        </p:spPr>
+        <p:txBody>
+          <a:bodyPr vert="horz" lIns="91440" tIns="45720" rIns="91440" bIns="45720" rtlCol="0" anchor="b"/>
+          <a:lstStyle>
+            <a:lvl1pPr algn="l">
+              <a:defRPr sz="1200"/>
+            </a:lvl1pPr>
+          </a:lstStyle>
+          <a:p>
+            <a:endParaRPr lang="fr-FR"/>
+          </a:p>
+        </p:txBody>
+      </p:sp>
+      <p:sp>
+        <p:nvSpPr>
+          <p:cNvPr id="7" name="Espace réservé du numéro de diapositive 6"/>
+          <p:cNvSpPr>
+            <a:spLocks noGrp="1"/>
+          </p:cNvSpPr>
+          <p:nvPr>
+            <p:ph type="sldNum" sz="quarter" idx="5"/>
+          </p:nvPr>
+        </p:nvSpPr>
+        <p:spPr>
+          <a:xfrm>
+            <a:off x="3884613" y="8685213"/>
+            <a:ext cx="2971800" cy="458787"/>
+          </a:xfrm>
+          <a:prstGeom prst="rect">
+            <a:avLst/>
+          </a:prstGeom>
+        </p:spPr>
+        <p:txBody>
+          <a:bodyPr vert="horz" lIns="91440" tIns="45720" rIns="91440" bIns="45720" rtlCol="0" anchor="b"/>
+          <a:lstStyle>
+            <a:lvl1pPr algn="r">
+              <a:defRPr sz="1200"/>
+            </a:lvl1pPr>
+          </a:lstStyle>
+          <a:p>
+            <a:fld id="{D7FD322A-515A-0348-ADB9-6F0253E1C49F}" type="slidenum">
+              <a:rPr lang="fr-FR" smtClean="0"/>
+              <a:t>‹N°›</a:t>
+            </a:fld>
+            <a:endParaRPr lang="fr-FR"/>
+          </a:p>
+        </p:txBody>
+      </p:sp>
+    </p:spTree>
+    <p:extLst>
+      <p:ext uri="{BB962C8B-B14F-4D97-AF65-F5344CB8AC3E}">
+        <p14:creationId xmlns:p14="http://schemas.microsoft.com/office/powerpoint/2010/main" val="661467596"/>
+      </p:ext>
+    </p:extLst>
+  </p:cSld>
+  <p:clrMap bg1="lt1" tx1="dk1" bg2="lt2" tx2="dk2" accent1="accent1" accent2="accent2" accent3="accent3" accent4="accent4" accent5="accent5" accent6="accent6" hlink="hlink" folHlink="folHlink"/>
+  <p:notesStyle>
+    <a:lvl1pPr marL="0" algn="l" defTabSz="914400" rtl="0" eaLnBrk="1" latinLnBrk="0" hangingPunct="1">
+      <a:defRPr sz="1200" kern="1200">
+        <a:solidFill>
+          <a:schemeClr val="tx1"/>
+        </a:solidFill>
+        <a:latin typeface="+mn-lt"/>
+        <a:ea typeface="+mn-ea"/>
+        <a:cs typeface="+mn-cs"/>
+      </a:defRPr>
+    </a:lvl1pPr>
+    <a:lvl2pPr marL="457200" algn="l" defTabSz="914400" rtl="0" eaLnBrk="1" latinLnBrk="0" hangingPunct="1">
+      <a:defRPr sz="1200" kern="1200">
+        <a:solidFill>
+          <a:schemeClr val="tx1"/>
+        </a:solidFill>
+        <a:latin typeface="+mn-lt"/>
+        <a:ea typeface="+mn-ea"/>
+        <a:cs typeface="+mn-cs"/>
+      </a:defRPr>
+    </a:lvl2pPr>
+    <a:lvl3pPr marL="914400" algn="l" defTabSz="914400" rtl="0" eaLnBrk="1" latinLnBrk="0" hangingPunct="1">
+      <a:defRPr sz="1200" kern="1200">
+        <a:solidFill>
+          <a:schemeClr val="tx1"/>
+        </a:solidFill>
+        <a:latin typeface="+mn-lt"/>
+        <a:ea typeface="+mn-ea"/>
+        <a:cs typeface="+mn-cs"/>
+      </a:defRPr>
+    </a:lvl3pPr>
+    <a:lvl4pPr marL="1371600" algn="l" defTabSz="914400" rtl="0" eaLnBrk="1" latinLnBrk="0" hangingPunct="1">
+      <a:defRPr sz="1200" kern="1200">
+        <a:solidFill>
+          <a:schemeClr val="tx1"/>
+        </a:solidFill>
+        <a:latin typeface="+mn-lt"/>
+        <a:ea typeface="+mn-ea"/>
+        <a:cs typeface="+mn-cs"/>
+      </a:defRPr>
+    </a:lvl4pPr>
+    <a:lvl5pPr marL="1828800" algn="l" defTabSz="914400" rtl="0" eaLnBrk="1" latinLnBrk="0" hangingPunct="1">
+      <a:defRPr sz="1200" kern="1200">
+        <a:solidFill>
+          <a:schemeClr val="tx1"/>
+        </a:solidFill>
+        <a:latin typeface="+mn-lt"/>
+        <a:ea typeface="+mn-ea"/>
+        <a:cs typeface="+mn-cs"/>
+      </a:defRPr>
+    </a:lvl5pPr>
+    <a:lvl6pPr marL="2286000" algn="l" defTabSz="914400" rtl="0" eaLnBrk="1" latinLnBrk="0" hangingPunct="1">
+      <a:defRPr sz="1200" kern="1200">
+        <a:solidFill>
+          <a:schemeClr val="tx1"/>
+        </a:solidFill>
+        <a:latin typeface="+mn-lt"/>
+        <a:ea typeface="+mn-ea"/>
+        <a:cs typeface="+mn-cs"/>
+      </a:defRPr>
+    </a:lvl6pPr>
+    <a:lvl7pPr marL="2743200" algn="l" defTabSz="914400" rtl="0" eaLnBrk="1" latinLnBrk="0" hangingPunct="1">
+      <a:defRPr sz="1200" kern="1200">
+        <a:solidFill>
+          <a:schemeClr val="tx1"/>
+        </a:solidFill>
+        <a:latin typeface="+mn-lt"/>
+        <a:ea typeface="+mn-ea"/>
+        <a:cs typeface="+mn-cs"/>
+      </a:defRPr>
+    </a:lvl7pPr>
+    <a:lvl8pPr marL="3200400" algn="l" defTabSz="914400" rtl="0" eaLnBrk="1" latinLnBrk="0" hangingPunct="1">
+      <a:defRPr sz="1200" kern="1200">
+        <a:solidFill>
+          <a:schemeClr val="tx1"/>
+        </a:solidFill>
+        <a:latin typeface="+mn-lt"/>
+        <a:ea typeface="+mn-ea"/>
+        <a:cs typeface="+mn-cs"/>
+      </a:defRPr>
+    </a:lvl8pPr>
+    <a:lvl9pPr marL="3657600" algn="l" defTabSz="914400" rtl="0" eaLnBrk="1" latinLnBrk="0" hangingPunct="1">
+      <a:defRPr sz="1200" kern="1200">
+        <a:solidFill>
+          <a:schemeClr val="tx1"/>
+        </a:solidFill>
+        <a:latin typeface="+mn-lt"/>
+        <a:ea typeface="+mn-ea"/>
+        <a:cs typeface="+mn-cs"/>
+      </a:defRPr>
+    </a:lvl9pPr>
+  </p:notesStyle>
+</p:notesMaster>
+</file>
+
+<file path=ppt/notesSlides/notesSlide1.xml><?xml version="1.0" encoding="utf-8"?>
+<p:notes xmlns:a="http://schemas.openxmlformats.org/drawingml/2006/main" xmlns:r="http://schemas.openxmlformats.org/officeDocument/2006/relationships" xmlns:p="http://schemas.openxmlformats.org/presentationml/2006/main">
+  <p:cSld>
+    <p:spTree>
+      <p:nvGrpSpPr>
+        <p:cNvPr id="1" name=""/>
+        <p:cNvGrpSpPr/>
+        <p:nvPr/>
+      </p:nvGrpSpPr>
+      <p:grpSpPr>
+        <a:xfrm>
+          <a:off x="0" y="0"/>
+          <a:ext cx="0" cy="0"/>
+          <a:chOff x="0" y="0"/>
+          <a:chExt cx="0" cy="0"/>
+        </a:xfrm>
+      </p:grpSpPr>
+      <p:sp>
+        <p:nvSpPr>
+          <p:cNvPr id="2" name="Espace réservé de l'image des diapositives 1"/>
+          <p:cNvSpPr>
+            <a:spLocks noGrp="1" noRot="1" noChangeAspect="1"/>
+          </p:cNvSpPr>
+          <p:nvPr>
+            <p:ph type="sldImg"/>
+          </p:nvPr>
+        </p:nvSpPr>
+        <p:spPr/>
+      </p:sp>
+      <p:sp>
+        <p:nvSpPr>
+          <p:cNvPr id="3" name="Espace réservé des notes 2"/>
+          <p:cNvSpPr>
+            <a:spLocks noGrp="1"/>
+          </p:cNvSpPr>
+          <p:nvPr>
+            <p:ph type="body" idx="1"/>
+          </p:nvPr>
+        </p:nvSpPr>
+        <p:spPr/>
+        <p:txBody>
+          <a:bodyPr/>
+          <a:lstStyle/>
+          <a:p>
+            <a:endParaRPr lang="fr-FR" dirty="0"/>
+          </a:p>
+        </p:txBody>
+      </p:sp>
+      <p:sp>
+        <p:nvSpPr>
+          <p:cNvPr id="4" name="Espace réservé du numéro de diapositive 3"/>
+          <p:cNvSpPr>
+            <a:spLocks noGrp="1"/>
+          </p:cNvSpPr>
+          <p:nvPr>
+            <p:ph type="sldNum" sz="quarter" idx="5"/>
+          </p:nvPr>
+        </p:nvSpPr>
+        <p:spPr/>
+        <p:txBody>
+          <a:bodyPr/>
+          <a:lstStyle/>
+          <a:p>
+            <a:fld id="{D7FD322A-515A-0348-ADB9-6F0253E1C49F}" type="slidenum">
+              <a:rPr lang="fr-FR" smtClean="0"/>
+              <a:t>10</a:t>
+            </a:fld>
+            <a:endParaRPr lang="fr-FR"/>
+          </a:p>
+        </p:txBody>
+      </p:sp>
+    </p:spTree>
+    <p:extLst>
+      <p:ext uri="{BB962C8B-B14F-4D97-AF65-F5344CB8AC3E}">
+        <p14:creationId xmlns:p14="http://schemas.microsoft.com/office/powerpoint/2010/main" val="3366911791"/>
+      </p:ext>
+    </p:extLst>
+  </p:cSld>
+  <p:clrMapOvr>
+    <a:masterClrMapping/>
+  </p:clrMapOvr>
+</p:notes>
 </file>
 
 <file path=ppt/slideLayouts/slideLayout1.xml><?xml version="1.0" encoding="utf-8"?>
@@ -273,7 +724,7 @@
           <a:p>
             <a:fld id="{32637B58-87C1-446D-BDA9-B06F4BCF7782}" type="datetimeFigureOut">
               <a:rPr lang="en-US" smtClean="0"/>
-              <a:t>1/31/22</a:t>
+              <a:t>2/1/22</a:t>
             </a:fld>
             <a:endParaRPr lang="en-US"/>
           </a:p>
@@ -476,7 +927,7 @@
           <a:p>
             <a:fld id="{32637B58-87C1-446D-BDA9-B06F4BCF7782}" type="datetimeFigureOut">
               <a:rPr lang="en-US" smtClean="0"/>
-              <a:t>1/31/22</a:t>
+              <a:t>2/1/22</a:t>
             </a:fld>
             <a:endParaRPr lang="en-US"/>
           </a:p>
@@ -684,7 +1135,7 @@
           <a:p>
             <a:fld id="{32637B58-87C1-446D-BDA9-B06F4BCF7782}" type="datetimeFigureOut">
               <a:rPr lang="en-US" smtClean="0"/>
-              <a:t>1/31/22</a:t>
+              <a:t>2/1/22</a:t>
             </a:fld>
             <a:endParaRPr lang="en-US"/>
           </a:p>
@@ -933,7 +1384,7 @@
           <a:p>
             <a:fld id="{32637B58-87C1-446D-BDA9-B06F4BCF7782}" type="datetimeFigureOut">
               <a:rPr lang="en-US" smtClean="0"/>
-              <a:t>1/31/22</a:t>
+              <a:t>2/1/22</a:t>
             </a:fld>
             <a:endParaRPr lang="en-US"/>
           </a:p>
@@ -1237,7 +1688,7 @@
           <a:p>
             <a:fld id="{32637B58-87C1-446D-BDA9-B06F4BCF7782}" type="datetimeFigureOut">
               <a:rPr lang="en-US" smtClean="0"/>
-              <a:t>1/31/22</a:t>
+              <a:t>2/1/22</a:t>
             </a:fld>
             <a:endParaRPr lang="en-US"/>
           </a:p>
@@ -1504,7 +1955,7 @@
           <a:p>
             <a:fld id="{32637B58-87C1-446D-BDA9-B06F4BCF7782}" type="datetimeFigureOut">
               <a:rPr lang="en-US" smtClean="0"/>
-              <a:t>1/31/22</a:t>
+              <a:t>2/1/22</a:t>
             </a:fld>
             <a:endParaRPr lang="en-US"/>
           </a:p>
@@ -1959,7 +2410,7 @@
           <a:p>
             <a:fld id="{32637B58-87C1-446D-BDA9-B06F4BCF7782}" type="datetimeFigureOut">
               <a:rPr lang="en-US" smtClean="0"/>
-              <a:t>1/31/22</a:t>
+              <a:t>2/1/22</a:t>
             </a:fld>
             <a:endParaRPr lang="en-US"/>
           </a:p>
@@ -2100,7 +2551,7 @@
           <a:p>
             <a:fld id="{32637B58-87C1-446D-BDA9-B06F4BCF7782}" type="datetimeFigureOut">
               <a:rPr lang="en-US" smtClean="0"/>
-              <a:t>1/31/22</a:t>
+              <a:t>2/1/22</a:t>
             </a:fld>
             <a:endParaRPr lang="en-US"/>
           </a:p>
@@ -2213,7 +2664,7 @@
           <a:p>
             <a:fld id="{32637B58-87C1-446D-BDA9-B06F4BCF7782}" type="datetimeFigureOut">
               <a:rPr lang="en-US" smtClean="0"/>
-              <a:t>1/31/22</a:t>
+              <a:t>2/1/22</a:t>
             </a:fld>
             <a:endParaRPr lang="en-US"/>
           </a:p>
@@ -2524,7 +2975,7 @@
           <a:p>
             <a:fld id="{32637B58-87C1-446D-BDA9-B06F4BCF7782}" type="datetimeFigureOut">
               <a:rPr lang="en-US" smtClean="0"/>
-              <a:t>1/31/22</a:t>
+              <a:t>2/1/22</a:t>
             </a:fld>
             <a:endParaRPr lang="en-US"/>
           </a:p>
@@ -2815,7 +3266,7 @@
           <a:p>
             <a:fld id="{32637B58-87C1-446D-BDA9-B06F4BCF7782}" type="datetimeFigureOut">
               <a:rPr lang="en-US" smtClean="0"/>
-              <a:t>1/31/22</a:t>
+              <a:t>2/1/22</a:t>
             </a:fld>
             <a:endParaRPr lang="en-US"/>
           </a:p>
@@ -3224,7 +3675,7 @@
             <a:fld id="{32637B58-87C1-446D-BDA9-B06F4BCF7782}" type="datetimeFigureOut">
               <a:rPr lang="en-US" smtClean="0"/>
               <a:pPr/>
-              <a:t>1/31/22</a:t>
+              <a:t>2/1/22</a:t>
             </a:fld>
             <a:endParaRPr lang="en-US" dirty="0"/>
           </a:p>
@@ -4273,6 +4724,1280 @@
 </p:sld>
 </file>
 
+<file path=ppt/slides/slide10.xml><?xml version="1.0" encoding="utf-8"?>
+<p:sld xmlns:a="http://schemas.openxmlformats.org/drawingml/2006/main" xmlns:r="http://schemas.openxmlformats.org/officeDocument/2006/relationships" xmlns:p="http://schemas.openxmlformats.org/presentationml/2006/main">
+  <p:cSld>
+    <p:spTree>
+      <p:nvGrpSpPr>
+        <p:cNvPr id="1" name=""/>
+        <p:cNvGrpSpPr/>
+        <p:nvPr/>
+      </p:nvGrpSpPr>
+      <p:grpSpPr>
+        <a:xfrm>
+          <a:off x="0" y="0"/>
+          <a:ext cx="0" cy="0"/>
+          <a:chOff x="0" y="0"/>
+          <a:chExt cx="0" cy="0"/>
+        </a:xfrm>
+      </p:grpSpPr>
+      <p:sp>
+        <p:nvSpPr>
+          <p:cNvPr id="2" name="Titre 1">
+            <a:extLst>
+              <a:ext uri="{FF2B5EF4-FFF2-40B4-BE49-F238E27FC236}">
+                <a16:creationId xmlns:a16="http://schemas.microsoft.com/office/drawing/2014/main" id="{79D3B3D3-3A9C-D140-83B7-E2075FEC6ABA}"/>
+              </a:ext>
+            </a:extLst>
+          </p:cNvPr>
+          <p:cNvSpPr>
+            <a:spLocks noGrp="1"/>
+          </p:cNvSpPr>
+          <p:nvPr>
+            <p:ph type="title"/>
+          </p:nvPr>
+        </p:nvSpPr>
+        <p:spPr/>
+        <p:txBody>
+          <a:bodyPr/>
+          <a:lstStyle/>
+          <a:p>
+            <a:r>
+              <a:rPr lang="fr-FR" dirty="0"/>
+              <a:t>Analyse algorithme optimisé</a:t>
+            </a:r>
+          </a:p>
+        </p:txBody>
+      </p:sp>
+      <p:sp>
+        <p:nvSpPr>
+          <p:cNvPr id="4" name="Espace réservé du contenu 2">
+            <a:extLst>
+              <a:ext uri="{FF2B5EF4-FFF2-40B4-BE49-F238E27FC236}">
+                <a16:creationId xmlns:a16="http://schemas.microsoft.com/office/drawing/2014/main" id="{B375C548-7E57-FC4C-8AE6-E70E8625234A}"/>
+              </a:ext>
+            </a:extLst>
+          </p:cNvPr>
+          <p:cNvSpPr>
+            <a:spLocks noGrp="1"/>
+          </p:cNvSpPr>
+          <p:nvPr>
+            <p:ph idx="1"/>
+          </p:nvPr>
+        </p:nvSpPr>
+        <p:spPr>
+          <a:xfrm>
+            <a:off x="985885" y="2086794"/>
+            <a:ext cx="9753600" cy="4255817"/>
+          </a:xfrm>
+        </p:spPr>
+        <p:txBody>
+          <a:bodyPr>
+            <a:noAutofit/>
+          </a:bodyPr>
+          <a:lstStyle/>
+          <a:p>
+            <a:r>
+              <a:rPr lang="fr-FR" b="1" u="sng" dirty="0">
+                <a:latin typeface="+mj-lt"/>
+              </a:rPr>
+              <a:t>Analyse temporelle : </a:t>
+            </a:r>
+          </a:p>
+          <a:p>
+            <a:pPr marL="0" indent="0">
+              <a:buNone/>
+            </a:pPr>
+            <a:r>
+              <a:rPr lang="fr-FR" dirty="0"/>
+              <a:t>L’algorithme optimisé crée une matrice ( ou table ) de </a:t>
+            </a:r>
+            <a:r>
+              <a:rPr lang="fr-FR" sz="2400" b="1" dirty="0"/>
+              <a:t>n</a:t>
+            </a:r>
+            <a:r>
+              <a:rPr lang="fr-FR" dirty="0"/>
+              <a:t> ( nombre d’items passés en paramètres ) par </a:t>
+            </a:r>
+            <a:r>
+              <a:rPr lang="fr-FR" sz="2400" b="1" dirty="0"/>
+              <a:t>w</a:t>
+            </a:r>
+            <a:r>
+              <a:rPr lang="fr-FR" dirty="0"/>
+              <a:t> ( capacité, ici appelée portefeuille ). Il itère ensuite sur toutes les cellules de cette matrice ( soit </a:t>
+            </a:r>
+            <a:r>
+              <a:rPr lang="fr-FR" sz="2400" dirty="0"/>
+              <a:t>n*w </a:t>
+            </a:r>
+            <a:r>
+              <a:rPr lang="fr-FR" dirty="0"/>
+              <a:t>cellules ).</a:t>
+            </a:r>
+            <a:endParaRPr lang="fr-FR" b="1" dirty="0"/>
+          </a:p>
+          <a:p>
+            <a:pPr marL="0" indent="0">
+              <a:buNone/>
+            </a:pPr>
+            <a:r>
+              <a:rPr lang="fr-FR" dirty="0"/>
+              <a:t>La complexité temporelle est donc </a:t>
+            </a:r>
+            <a:r>
+              <a:rPr lang="fr-FR" b="1" dirty="0"/>
+              <a:t>O</a:t>
+            </a:r>
+            <a:r>
+              <a:rPr lang="fr-FR" sz="2400" b="1" dirty="0"/>
+              <a:t>(n*w) </a:t>
+            </a:r>
+            <a:r>
+              <a:rPr lang="fr-FR" dirty="0"/>
+              <a:t>selon la notation </a:t>
+            </a:r>
+            <a:r>
+              <a:rPr lang="fr-FR" dirty="0" err="1"/>
+              <a:t>BigO</a:t>
+            </a:r>
+            <a:endParaRPr lang="fr-FR" dirty="0"/>
+          </a:p>
+          <a:p>
+            <a:r>
+              <a:rPr lang="fr-FR" b="1" u="sng" dirty="0">
+                <a:latin typeface="+mj-lt"/>
+              </a:rPr>
+              <a:t>Analyse de la mémoire : </a:t>
+            </a:r>
+          </a:p>
+          <a:p>
+            <a:pPr marL="0" indent="0">
+              <a:buNone/>
+            </a:pPr>
+            <a:r>
+              <a:rPr lang="fr-FR" dirty="0"/>
+              <a:t>L’algorithme crée une matrice en deux dimensions de taille </a:t>
+            </a:r>
+            <a:r>
+              <a:rPr lang="fr-FR" sz="2400" b="1" dirty="0"/>
+              <a:t>n*w</a:t>
+            </a:r>
+            <a:r>
+              <a:rPr lang="fr-FR" dirty="0"/>
+              <a:t>. Sa complexité spatiale est donc </a:t>
+            </a:r>
+            <a:r>
+              <a:rPr lang="fr-FR" sz="2400" b="1" dirty="0"/>
+              <a:t>O(n*w)</a:t>
+            </a:r>
+            <a:r>
+              <a:rPr lang="fr-FR" dirty="0"/>
+              <a:t>.</a:t>
+            </a:r>
+          </a:p>
+          <a:p>
+            <a:pPr marL="0" indent="0">
+              <a:buNone/>
+            </a:pPr>
+            <a:endParaRPr lang="fr-FR" b="1" dirty="0"/>
+          </a:p>
+        </p:txBody>
+      </p:sp>
+    </p:spTree>
+    <p:extLst>
+      <p:ext uri="{BB962C8B-B14F-4D97-AF65-F5344CB8AC3E}">
+        <p14:creationId xmlns:p14="http://schemas.microsoft.com/office/powerpoint/2010/main" val="1586402827"/>
+      </p:ext>
+    </p:extLst>
+  </p:cSld>
+  <p:clrMapOvr>
+    <a:masterClrMapping/>
+  </p:clrMapOvr>
+</p:sld>
+</file>
+
+<file path=ppt/slides/slide11.xml><?xml version="1.0" encoding="utf-8"?>
+<p:sld xmlns:a="http://schemas.openxmlformats.org/drawingml/2006/main" xmlns:r="http://schemas.openxmlformats.org/officeDocument/2006/relationships" xmlns:p="http://schemas.openxmlformats.org/presentationml/2006/main">
+  <p:cSld>
+    <p:spTree>
+      <p:nvGrpSpPr>
+        <p:cNvPr id="1" name=""/>
+        <p:cNvGrpSpPr/>
+        <p:nvPr/>
+      </p:nvGrpSpPr>
+      <p:grpSpPr>
+        <a:xfrm>
+          <a:off x="0" y="0"/>
+          <a:ext cx="0" cy="0"/>
+          <a:chOff x="0" y="0"/>
+          <a:chExt cx="0" cy="0"/>
+        </a:xfrm>
+      </p:grpSpPr>
+      <p:sp>
+        <p:nvSpPr>
+          <p:cNvPr id="2" name="Titre 1">
+            <a:extLst>
+              <a:ext uri="{FF2B5EF4-FFF2-40B4-BE49-F238E27FC236}">
+                <a16:creationId xmlns:a16="http://schemas.microsoft.com/office/drawing/2014/main" id="{52E68B3E-46BB-6147-80E0-E88FE05B0856}"/>
+              </a:ext>
+            </a:extLst>
+          </p:cNvPr>
+          <p:cNvSpPr>
+            <a:spLocks noGrp="1"/>
+          </p:cNvSpPr>
+          <p:nvPr>
+            <p:ph type="title"/>
+          </p:nvPr>
+        </p:nvSpPr>
+        <p:spPr/>
+        <p:txBody>
+          <a:bodyPr/>
+          <a:lstStyle/>
+          <a:p>
+            <a:r>
+              <a:rPr lang="fr-FR" dirty="0"/>
+              <a:t>Comparaison brute-force/optimisé</a:t>
+            </a:r>
+          </a:p>
+        </p:txBody>
+      </p:sp>
+      <p:sp>
+        <p:nvSpPr>
+          <p:cNvPr id="3" name="Espace réservé du contenu 2">
+            <a:extLst>
+              <a:ext uri="{FF2B5EF4-FFF2-40B4-BE49-F238E27FC236}">
+                <a16:creationId xmlns:a16="http://schemas.microsoft.com/office/drawing/2014/main" id="{D00D73F0-885F-5D4E-AF09-0711EA5C2B43}"/>
+              </a:ext>
+            </a:extLst>
+          </p:cNvPr>
+          <p:cNvSpPr>
+            <a:spLocks noGrp="1"/>
+          </p:cNvSpPr>
+          <p:nvPr>
+            <p:ph idx="1"/>
+          </p:nvPr>
+        </p:nvSpPr>
+        <p:spPr>
+          <a:xfrm>
+            <a:off x="914400" y="1919673"/>
+            <a:ext cx="9914860" cy="4223432"/>
+          </a:xfrm>
+        </p:spPr>
+        <p:txBody>
+          <a:bodyPr/>
+          <a:lstStyle/>
+          <a:p>
+            <a:r>
+              <a:rPr lang="fr-FR" dirty="0"/>
+              <a:t>Sur le </a:t>
+            </a:r>
+            <a:r>
+              <a:rPr lang="fr-FR" dirty="0" err="1"/>
+              <a:t>dataset</a:t>
+            </a:r>
+            <a:r>
+              <a:rPr lang="fr-FR" dirty="0"/>
+              <a:t> 0, les deux algorithmes fournissent les valeurs suivantes :</a:t>
+            </a:r>
+          </a:p>
+          <a:p>
+            <a:endParaRPr lang="fr-FR" dirty="0"/>
+          </a:p>
+          <a:p>
+            <a:endParaRPr lang="fr-FR" dirty="0"/>
+          </a:p>
+          <a:p>
+            <a:endParaRPr lang="fr-FR" dirty="0"/>
+          </a:p>
+          <a:p>
+            <a:endParaRPr lang="fr-FR" dirty="0"/>
+          </a:p>
+          <a:p>
+            <a:endParaRPr lang="fr-FR" dirty="0"/>
+          </a:p>
+          <a:p>
+            <a:r>
+              <a:rPr lang="fr-FR" dirty="0"/>
+              <a:t>On observe que les deux algorithmes trouvent les mêmes résultats mais le second est presque 3 fois plus rapide sur ce </a:t>
+            </a:r>
+            <a:r>
+              <a:rPr lang="fr-FR" dirty="0" err="1"/>
+              <a:t>dataset</a:t>
+            </a:r>
+            <a:r>
+              <a:rPr lang="fr-FR" dirty="0"/>
+              <a:t>. </a:t>
+            </a:r>
+          </a:p>
+          <a:p>
+            <a:endParaRPr lang="fr-FR" dirty="0"/>
+          </a:p>
+        </p:txBody>
+      </p:sp>
+      <p:sp>
+        <p:nvSpPr>
+          <p:cNvPr id="5" name="ZoneTexte 4">
+            <a:extLst>
+              <a:ext uri="{FF2B5EF4-FFF2-40B4-BE49-F238E27FC236}">
+                <a16:creationId xmlns:a16="http://schemas.microsoft.com/office/drawing/2014/main" id="{D067A00C-047D-A74A-BC24-56EF6B3DD342}"/>
+              </a:ext>
+            </a:extLst>
+          </p:cNvPr>
+          <p:cNvSpPr txBox="1"/>
+          <p:nvPr/>
+        </p:nvSpPr>
+        <p:spPr>
+          <a:xfrm>
+            <a:off x="1362740" y="2654530"/>
+            <a:ext cx="4247804" cy="2017223"/>
+          </a:xfrm>
+          <a:prstGeom prst="rect">
+            <a:avLst/>
+          </a:prstGeom>
+          <a:noFill/>
+          <a:ln w="47625">
+            <a:solidFill>
+              <a:schemeClr val="accent1"/>
+            </a:solidFill>
+          </a:ln>
+        </p:spPr>
+        <p:txBody>
+          <a:bodyPr wrap="square" lIns="251999" rIns="251999" rtlCol="0">
+            <a:noAutofit/>
+          </a:bodyPr>
+          <a:lstStyle/>
+          <a:p>
+            <a:pPr algn="ctr"/>
+            <a:r>
+              <a:rPr lang="fr-FR" u="sng" dirty="0">
+                <a:latin typeface="+mj-lt"/>
+              </a:rPr>
+              <a:t>Brute force :</a:t>
+            </a:r>
+          </a:p>
+          <a:p>
+            <a:endParaRPr lang="fr-FR" dirty="0"/>
+          </a:p>
+          <a:p>
+            <a:r>
+              <a:rPr lang="fr-FR" dirty="0"/>
+              <a:t>Prix total : </a:t>
+            </a:r>
+            <a:r>
+              <a:rPr lang="fr-FR" sz="2000" b="1" dirty="0"/>
+              <a:t>498,0€</a:t>
+            </a:r>
+          </a:p>
+          <a:p>
+            <a:r>
+              <a:rPr lang="fr-FR" dirty="0"/>
+              <a:t>Bénéfices après deux ans : </a:t>
+            </a:r>
+            <a:r>
+              <a:rPr lang="fr-FR" sz="2000" b="1" dirty="0"/>
+              <a:t>99,08€</a:t>
+            </a:r>
+          </a:p>
+          <a:p>
+            <a:endParaRPr lang="fr-FR" dirty="0"/>
+          </a:p>
+          <a:p>
+            <a:r>
+              <a:rPr lang="fr-FR" dirty="0"/>
+              <a:t>Temps d’exécution ≃ </a:t>
+            </a:r>
+            <a:r>
+              <a:rPr lang="fr-FR" sz="2000" b="1" dirty="0"/>
+              <a:t>1,9sec</a:t>
+            </a:r>
+          </a:p>
+        </p:txBody>
+      </p:sp>
+      <p:sp>
+        <p:nvSpPr>
+          <p:cNvPr id="6" name="ZoneTexte 5">
+            <a:extLst>
+              <a:ext uri="{FF2B5EF4-FFF2-40B4-BE49-F238E27FC236}">
+                <a16:creationId xmlns:a16="http://schemas.microsoft.com/office/drawing/2014/main" id="{0FB2A94C-9309-494F-ABDC-1BB799142E33}"/>
+              </a:ext>
+            </a:extLst>
+          </p:cNvPr>
+          <p:cNvSpPr txBox="1"/>
+          <p:nvPr/>
+        </p:nvSpPr>
+        <p:spPr>
+          <a:xfrm>
+            <a:off x="6581456" y="2654530"/>
+            <a:ext cx="4247804" cy="2017223"/>
+          </a:xfrm>
+          <a:prstGeom prst="rect">
+            <a:avLst/>
+          </a:prstGeom>
+          <a:noFill/>
+          <a:ln w="47625">
+            <a:solidFill>
+              <a:schemeClr val="accent1"/>
+            </a:solidFill>
+          </a:ln>
+        </p:spPr>
+        <p:txBody>
+          <a:bodyPr wrap="square" lIns="251999" rIns="251999" rtlCol="0">
+            <a:noAutofit/>
+          </a:bodyPr>
+          <a:lstStyle/>
+          <a:p>
+            <a:pPr algn="ctr"/>
+            <a:r>
+              <a:rPr lang="fr-FR" u="sng" dirty="0">
+                <a:latin typeface="+mj-lt"/>
+              </a:rPr>
+              <a:t>Algorithme optimisé:</a:t>
+            </a:r>
+          </a:p>
+          <a:p>
+            <a:endParaRPr lang="fr-FR" dirty="0"/>
+          </a:p>
+          <a:p>
+            <a:r>
+              <a:rPr lang="fr-FR" dirty="0"/>
+              <a:t>Prix total : </a:t>
+            </a:r>
+            <a:r>
+              <a:rPr lang="fr-FR" sz="2000" b="1" dirty="0"/>
+              <a:t>498,0€</a:t>
+            </a:r>
+          </a:p>
+          <a:p>
+            <a:r>
+              <a:rPr lang="fr-FR" dirty="0"/>
+              <a:t>Bénéfices après deux ans : </a:t>
+            </a:r>
+            <a:r>
+              <a:rPr lang="fr-FR" sz="2000" b="1" dirty="0"/>
+              <a:t>99,08€</a:t>
+            </a:r>
+          </a:p>
+          <a:p>
+            <a:endParaRPr lang="fr-FR" dirty="0"/>
+          </a:p>
+          <a:p>
+            <a:r>
+              <a:rPr lang="fr-FR" dirty="0"/>
+              <a:t>Temps d’exécution ≃ </a:t>
+            </a:r>
+            <a:r>
+              <a:rPr lang="fr-FR" sz="2000" b="1" dirty="0"/>
+              <a:t>0,7sec</a:t>
+            </a:r>
+          </a:p>
+        </p:txBody>
+      </p:sp>
+    </p:spTree>
+    <p:extLst>
+      <p:ext uri="{BB962C8B-B14F-4D97-AF65-F5344CB8AC3E}">
+        <p14:creationId xmlns:p14="http://schemas.microsoft.com/office/powerpoint/2010/main" val="3594086923"/>
+      </p:ext>
+    </p:extLst>
+  </p:cSld>
+  <p:clrMapOvr>
+    <a:masterClrMapping/>
+  </p:clrMapOvr>
+</p:sld>
+</file>
+
+<file path=ppt/slides/slide12.xml><?xml version="1.0" encoding="utf-8"?>
+<p:sld xmlns:a="http://schemas.openxmlformats.org/drawingml/2006/main" xmlns:r="http://schemas.openxmlformats.org/officeDocument/2006/relationships" xmlns:p="http://schemas.openxmlformats.org/presentationml/2006/main">
+  <p:cSld>
+    <p:spTree>
+      <p:nvGrpSpPr>
+        <p:cNvPr id="1" name=""/>
+        <p:cNvGrpSpPr/>
+        <p:nvPr/>
+      </p:nvGrpSpPr>
+      <p:grpSpPr>
+        <a:xfrm>
+          <a:off x="0" y="0"/>
+          <a:ext cx="0" cy="0"/>
+          <a:chOff x="0" y="0"/>
+          <a:chExt cx="0" cy="0"/>
+        </a:xfrm>
+      </p:grpSpPr>
+      <p:sp>
+        <p:nvSpPr>
+          <p:cNvPr id="2" name="Titre 1">
+            <a:extLst>
+              <a:ext uri="{FF2B5EF4-FFF2-40B4-BE49-F238E27FC236}">
+                <a16:creationId xmlns:a16="http://schemas.microsoft.com/office/drawing/2014/main" id="{7BD0B8F0-B238-9542-A0B0-F533E33A2793}"/>
+              </a:ext>
+            </a:extLst>
+          </p:cNvPr>
+          <p:cNvSpPr>
+            <a:spLocks noGrp="1"/>
+          </p:cNvSpPr>
+          <p:nvPr>
+            <p:ph type="title"/>
+          </p:nvPr>
+        </p:nvSpPr>
+        <p:spPr/>
+        <p:txBody>
+          <a:bodyPr/>
+          <a:lstStyle/>
+          <a:p>
+            <a:r>
+              <a:rPr lang="fr-FR" dirty="0"/>
+              <a:t>Comparaison avec </a:t>
+            </a:r>
+            <a:r>
+              <a:rPr lang="fr-FR" dirty="0" err="1"/>
+              <a:t>Sienna</a:t>
+            </a:r>
+            <a:r>
+              <a:rPr lang="fr-FR" dirty="0"/>
+              <a:t> </a:t>
+            </a:r>
+            <a:r>
+              <a:rPr lang="fr-FR" dirty="0" err="1"/>
+              <a:t>Dataset</a:t>
+            </a:r>
+            <a:r>
+              <a:rPr lang="fr-FR" dirty="0"/>
+              <a:t> 1</a:t>
+            </a:r>
+          </a:p>
+        </p:txBody>
+      </p:sp>
+      <p:sp>
+        <p:nvSpPr>
+          <p:cNvPr id="4" name="ZoneTexte 3">
+            <a:extLst>
+              <a:ext uri="{FF2B5EF4-FFF2-40B4-BE49-F238E27FC236}">
+                <a16:creationId xmlns:a16="http://schemas.microsoft.com/office/drawing/2014/main" id="{FE284188-4F97-5B4C-83BD-5ADC8CF94F3F}"/>
+              </a:ext>
+            </a:extLst>
+          </p:cNvPr>
+          <p:cNvSpPr txBox="1"/>
+          <p:nvPr/>
+        </p:nvSpPr>
+        <p:spPr>
+          <a:xfrm>
+            <a:off x="800232" y="2061555"/>
+            <a:ext cx="5062451" cy="3125587"/>
+          </a:xfrm>
+          <a:prstGeom prst="rect">
+            <a:avLst/>
+          </a:prstGeom>
+          <a:noFill/>
+          <a:ln w="47625">
+            <a:solidFill>
+              <a:schemeClr val="accent1"/>
+            </a:solidFill>
+          </a:ln>
+        </p:spPr>
+        <p:txBody>
+          <a:bodyPr wrap="square" lIns="251999" tIns="108000" rIns="251999" rtlCol="0">
+            <a:noAutofit/>
+          </a:bodyPr>
+          <a:lstStyle/>
+          <a:p>
+            <a:pPr algn="ctr"/>
+            <a:r>
+              <a:rPr lang="fr-FR" u="sng" dirty="0">
+                <a:latin typeface="+mj-lt"/>
+              </a:rPr>
+              <a:t>Mes résultats</a:t>
+            </a:r>
+          </a:p>
+          <a:p>
+            <a:endParaRPr lang="fr-FR" dirty="0"/>
+          </a:p>
+          <a:p>
+            <a:r>
+              <a:rPr lang="fr-FR" b="1" u="sng" dirty="0"/>
+              <a:t>Actions achetées :</a:t>
+            </a:r>
+            <a:r>
+              <a:rPr lang="fr-FR" b="1" dirty="0"/>
+              <a:t> </a:t>
+            </a:r>
+            <a:r>
+              <a:rPr lang="fr-FR" sz="1400" dirty="0"/>
+              <a:t>(Share-KMTG), (Share-GHIZ), (Share-NHWA), (Share-UEZB), (Share-LPDM), (Share-MTLR), (Share-USSR), (Share-GTQK), (Share-FKJW), (Share-MLGM), (Share-QLMK), (Share-WPLI), (Share-LGWG), (Share-ZSDE), (Share-SKKC), (Share-QQTU), (Share-GIAJ), (Share-XJMO), (Share-LRBZ), (Share-KZBL), (Share-EMOV), (Share-IFCP)</a:t>
+            </a:r>
+          </a:p>
+          <a:p>
+            <a:endParaRPr lang="fr-FR" sz="1400" dirty="0"/>
+          </a:p>
+          <a:p>
+            <a:r>
+              <a:rPr lang="fr-FR" b="1" u="sng" dirty="0"/>
+              <a:t>Prix total :</a:t>
+            </a:r>
+            <a:r>
+              <a:rPr lang="fr-FR" b="1" dirty="0"/>
+              <a:t> </a:t>
+            </a:r>
+            <a:r>
+              <a:rPr lang="fr-FR" dirty="0"/>
+              <a:t>499,95€</a:t>
+            </a:r>
+            <a:endParaRPr lang="fr-FR" b="1" u="sng" dirty="0"/>
+          </a:p>
+          <a:p>
+            <a:r>
+              <a:rPr lang="fr-FR" b="1" u="sng" dirty="0"/>
+              <a:t>Bénéfices après deux ans :</a:t>
+            </a:r>
+            <a:r>
+              <a:rPr lang="fr-FR" b="1" dirty="0"/>
+              <a:t> </a:t>
+            </a:r>
+            <a:r>
+              <a:rPr lang="fr-FR" dirty="0"/>
+              <a:t>198,54€</a:t>
+            </a:r>
+            <a:endParaRPr lang="fr-FR" b="1" u="sng" dirty="0"/>
+          </a:p>
+        </p:txBody>
+      </p:sp>
+      <p:sp>
+        <p:nvSpPr>
+          <p:cNvPr id="5" name="ZoneTexte 4">
+            <a:extLst>
+              <a:ext uri="{FF2B5EF4-FFF2-40B4-BE49-F238E27FC236}">
+                <a16:creationId xmlns:a16="http://schemas.microsoft.com/office/drawing/2014/main" id="{27CF798B-8D23-5E44-8CA9-3FCAE81B699B}"/>
+              </a:ext>
+            </a:extLst>
+          </p:cNvPr>
+          <p:cNvSpPr txBox="1"/>
+          <p:nvPr/>
+        </p:nvSpPr>
+        <p:spPr>
+          <a:xfrm>
+            <a:off x="6329317" y="2061555"/>
+            <a:ext cx="5062451" cy="3125587"/>
+          </a:xfrm>
+          <a:prstGeom prst="rect">
+            <a:avLst/>
+          </a:prstGeom>
+          <a:noFill/>
+          <a:ln w="47625">
+            <a:solidFill>
+              <a:schemeClr val="accent1"/>
+            </a:solidFill>
+          </a:ln>
+        </p:spPr>
+        <p:txBody>
+          <a:bodyPr wrap="square" lIns="251999" tIns="108000" rIns="251999" rtlCol="0">
+            <a:noAutofit/>
+          </a:bodyPr>
+          <a:lstStyle/>
+          <a:p>
+            <a:pPr algn="ctr"/>
+            <a:r>
+              <a:rPr lang="fr-FR" u="sng" dirty="0">
+                <a:latin typeface="+mj-lt"/>
+              </a:rPr>
+              <a:t>Résultats de </a:t>
+            </a:r>
+            <a:r>
+              <a:rPr lang="fr-FR" u="sng" dirty="0" err="1">
+                <a:latin typeface="+mj-lt"/>
+              </a:rPr>
+              <a:t>Sienna</a:t>
+            </a:r>
+            <a:endParaRPr lang="fr-FR" u="sng" dirty="0">
+              <a:latin typeface="+mj-lt"/>
+            </a:endParaRPr>
+          </a:p>
+          <a:p>
+            <a:endParaRPr lang="fr-FR" dirty="0"/>
+          </a:p>
+          <a:p>
+            <a:r>
+              <a:rPr lang="fr-FR" b="1" u="sng" dirty="0"/>
+              <a:t>Actions achetées :</a:t>
+            </a:r>
+            <a:r>
+              <a:rPr lang="fr-FR" b="1" dirty="0"/>
+              <a:t> </a:t>
+            </a:r>
+            <a:r>
+              <a:rPr lang="fr-FR" sz="1400" dirty="0"/>
+              <a:t>Share-GRUT</a:t>
+            </a:r>
+          </a:p>
+          <a:p>
+            <a:endParaRPr lang="fr-FR" dirty="0"/>
+          </a:p>
+          <a:p>
+            <a:endParaRPr lang="fr-FR" dirty="0"/>
+          </a:p>
+          <a:p>
+            <a:endParaRPr lang="fr-FR" dirty="0"/>
+          </a:p>
+          <a:p>
+            <a:endParaRPr lang="fr-FR" dirty="0"/>
+          </a:p>
+          <a:p>
+            <a:endParaRPr lang="fr-FR" dirty="0"/>
+          </a:p>
+          <a:p>
+            <a:r>
+              <a:rPr lang="fr-FR" b="1" u="sng" dirty="0"/>
+              <a:t>Prix total :</a:t>
+            </a:r>
+            <a:r>
+              <a:rPr lang="fr-FR" b="1" dirty="0"/>
+              <a:t> </a:t>
+            </a:r>
+            <a:r>
+              <a:rPr lang="fr-FR" dirty="0"/>
+              <a:t>498.76€</a:t>
+            </a:r>
+            <a:endParaRPr lang="fr-FR" b="1" u="sng" dirty="0"/>
+          </a:p>
+          <a:p>
+            <a:r>
+              <a:rPr lang="fr-FR" b="1" u="sng" dirty="0"/>
+              <a:t>Bénéfices après deux ans :</a:t>
+            </a:r>
+            <a:r>
+              <a:rPr lang="fr-FR" b="1" dirty="0"/>
+              <a:t> </a:t>
+            </a:r>
+            <a:r>
+              <a:rPr lang="fr-FR" dirty="0"/>
+              <a:t>196.61€</a:t>
+            </a:r>
+            <a:endParaRPr lang="fr-FR" b="1" u="sng" dirty="0"/>
+          </a:p>
+        </p:txBody>
+      </p:sp>
+      <p:sp>
+        <p:nvSpPr>
+          <p:cNvPr id="6" name="ZoneTexte 5">
+            <a:extLst>
+              <a:ext uri="{FF2B5EF4-FFF2-40B4-BE49-F238E27FC236}">
+                <a16:creationId xmlns:a16="http://schemas.microsoft.com/office/drawing/2014/main" id="{A22601B3-CE11-F145-B7E4-FCFD3DFC2F39}"/>
+              </a:ext>
+            </a:extLst>
+          </p:cNvPr>
+          <p:cNvSpPr txBox="1"/>
+          <p:nvPr/>
+        </p:nvSpPr>
+        <p:spPr>
+          <a:xfrm>
+            <a:off x="1199659" y="5527964"/>
+            <a:ext cx="9792681" cy="646331"/>
+          </a:xfrm>
+          <a:prstGeom prst="rect">
+            <a:avLst/>
+          </a:prstGeom>
+          <a:noFill/>
+        </p:spPr>
+        <p:txBody>
+          <a:bodyPr wrap="none" rtlCol="0">
+            <a:spAutoFit/>
+          </a:bodyPr>
+          <a:lstStyle/>
+          <a:p>
+            <a:r>
+              <a:rPr lang="fr-FR" b="1" dirty="0"/>
+              <a:t>Cette comparaison n’est pas valable car les données fournies par </a:t>
+            </a:r>
+            <a:r>
+              <a:rPr lang="fr-FR" b="1" dirty="0" err="1"/>
+              <a:t>Sienna</a:t>
+            </a:r>
+            <a:r>
+              <a:rPr lang="fr-FR" b="1" dirty="0"/>
+              <a:t> ne sont pas cohérentes </a:t>
+            </a:r>
+          </a:p>
+          <a:p>
+            <a:r>
+              <a:rPr lang="fr-FR" b="1" dirty="0"/>
+              <a:t>Et donc pas utilisables. </a:t>
+            </a:r>
+          </a:p>
+        </p:txBody>
+      </p:sp>
+    </p:spTree>
+    <p:extLst>
+      <p:ext uri="{BB962C8B-B14F-4D97-AF65-F5344CB8AC3E}">
+        <p14:creationId xmlns:p14="http://schemas.microsoft.com/office/powerpoint/2010/main" val="3593966759"/>
+      </p:ext>
+    </p:extLst>
+  </p:cSld>
+  <p:clrMapOvr>
+    <a:masterClrMapping/>
+  </p:clrMapOvr>
+</p:sld>
+</file>
+
+<file path=ppt/slides/slide13.xml><?xml version="1.0" encoding="utf-8"?>
+<p:sld xmlns:a="http://schemas.openxmlformats.org/drawingml/2006/main" xmlns:r="http://schemas.openxmlformats.org/officeDocument/2006/relationships" xmlns:p="http://schemas.openxmlformats.org/presentationml/2006/main">
+  <p:cSld>
+    <p:spTree>
+      <p:nvGrpSpPr>
+        <p:cNvPr id="1" name=""/>
+        <p:cNvGrpSpPr/>
+        <p:nvPr/>
+      </p:nvGrpSpPr>
+      <p:grpSpPr>
+        <a:xfrm>
+          <a:off x="0" y="0"/>
+          <a:ext cx="0" cy="0"/>
+          <a:chOff x="0" y="0"/>
+          <a:chExt cx="0" cy="0"/>
+        </a:xfrm>
+      </p:grpSpPr>
+      <p:sp>
+        <p:nvSpPr>
+          <p:cNvPr id="2" name="Titre 1">
+            <a:extLst>
+              <a:ext uri="{FF2B5EF4-FFF2-40B4-BE49-F238E27FC236}">
+                <a16:creationId xmlns:a16="http://schemas.microsoft.com/office/drawing/2014/main" id="{7BD0B8F0-B238-9542-A0B0-F533E33A2793}"/>
+              </a:ext>
+            </a:extLst>
+          </p:cNvPr>
+          <p:cNvSpPr>
+            <a:spLocks noGrp="1"/>
+          </p:cNvSpPr>
+          <p:nvPr>
+            <p:ph type="title"/>
+          </p:nvPr>
+        </p:nvSpPr>
+        <p:spPr/>
+        <p:txBody>
+          <a:bodyPr/>
+          <a:lstStyle/>
+          <a:p>
+            <a:r>
+              <a:rPr lang="fr-FR" dirty="0"/>
+              <a:t>Comparaison avec </a:t>
+            </a:r>
+            <a:r>
+              <a:rPr lang="fr-FR" dirty="0" err="1"/>
+              <a:t>Sienna</a:t>
+            </a:r>
+            <a:r>
+              <a:rPr lang="fr-FR" dirty="0"/>
+              <a:t> </a:t>
+            </a:r>
+            <a:r>
+              <a:rPr lang="fr-FR" dirty="0" err="1"/>
+              <a:t>Dataset</a:t>
+            </a:r>
+            <a:r>
+              <a:rPr lang="fr-FR" dirty="0"/>
+              <a:t> 2</a:t>
+            </a:r>
+          </a:p>
+        </p:txBody>
+      </p:sp>
+      <p:sp>
+        <p:nvSpPr>
+          <p:cNvPr id="4" name="ZoneTexte 3">
+            <a:extLst>
+              <a:ext uri="{FF2B5EF4-FFF2-40B4-BE49-F238E27FC236}">
+                <a16:creationId xmlns:a16="http://schemas.microsoft.com/office/drawing/2014/main" id="{FE284188-4F97-5B4C-83BD-5ADC8CF94F3F}"/>
+              </a:ext>
+            </a:extLst>
+          </p:cNvPr>
+          <p:cNvSpPr txBox="1"/>
+          <p:nvPr/>
+        </p:nvSpPr>
+        <p:spPr>
+          <a:xfrm>
+            <a:off x="800232" y="2061555"/>
+            <a:ext cx="5062451" cy="3350030"/>
+          </a:xfrm>
+          <a:prstGeom prst="rect">
+            <a:avLst/>
+          </a:prstGeom>
+          <a:noFill/>
+          <a:ln w="47625">
+            <a:solidFill>
+              <a:schemeClr val="accent1"/>
+            </a:solidFill>
+          </a:ln>
+        </p:spPr>
+        <p:txBody>
+          <a:bodyPr wrap="square" lIns="251999" tIns="108000" rIns="251999" rtlCol="0">
+            <a:noAutofit/>
+          </a:bodyPr>
+          <a:lstStyle/>
+          <a:p>
+            <a:pPr algn="ctr"/>
+            <a:r>
+              <a:rPr lang="fr-FR" u="sng" dirty="0">
+                <a:latin typeface="+mj-lt"/>
+              </a:rPr>
+              <a:t>Mes résultats</a:t>
+            </a:r>
+          </a:p>
+          <a:p>
+            <a:endParaRPr lang="fr-FR" dirty="0"/>
+          </a:p>
+          <a:p>
+            <a:r>
+              <a:rPr lang="fr-FR" b="1" u="sng" dirty="0"/>
+              <a:t>Actions achetées :</a:t>
+            </a:r>
+            <a:r>
+              <a:rPr lang="fr-FR" b="1" dirty="0"/>
+              <a:t> </a:t>
+            </a:r>
+            <a:r>
+              <a:rPr lang="fr-FR" sz="1400" dirty="0"/>
+              <a:t>Share-ECAQ, Share-IXCI, Share-FWBE, Share-ZOFA, Share-PLLK, </a:t>
+            </a:r>
+            <a:r>
+              <a:rPr lang="fr-FR" sz="1400" dirty="0">
+                <a:highlight>
+                  <a:srgbClr val="FFFF00"/>
+                </a:highlight>
+              </a:rPr>
+              <a:t>Share-YNGA</a:t>
+            </a:r>
+            <a:r>
+              <a:rPr lang="fr-FR" sz="1400" dirty="0"/>
+              <a:t>, Share-ANFX, Share-PATS, </a:t>
+            </a:r>
+            <a:r>
+              <a:rPr lang="fr-FR" sz="1400" dirty="0">
+                <a:highlight>
+                  <a:srgbClr val="FFFF00"/>
+                </a:highlight>
+              </a:rPr>
+              <a:t>Share-PUCI,</a:t>
+            </a:r>
+            <a:r>
+              <a:rPr lang="fr-FR" sz="1400" dirty="0"/>
+              <a:t> </a:t>
+            </a:r>
+            <a:r>
+              <a:rPr lang="fr-FR" sz="1400" dirty="0">
+                <a:highlight>
+                  <a:srgbClr val="FFFF00"/>
+                </a:highlight>
+              </a:rPr>
+              <a:t>Share-VCXT</a:t>
+            </a:r>
+            <a:r>
+              <a:rPr lang="fr-FR" sz="1400" dirty="0"/>
+              <a:t>, Share-NDKR, Share-ALIY, Share-JWGF,</a:t>
+            </a:r>
+            <a:r>
+              <a:rPr lang="fr-FR" sz="1400" dirty="0">
+                <a:highlight>
+                  <a:srgbClr val="FFFF00"/>
+                </a:highlight>
+              </a:rPr>
+              <a:t> Share-MPJI</a:t>
+            </a:r>
+            <a:r>
+              <a:rPr lang="fr-FR" sz="1400" dirty="0"/>
+              <a:t>, </a:t>
+            </a:r>
+            <a:r>
+              <a:rPr lang="fr-FR" sz="1400" dirty="0">
+                <a:highlight>
+                  <a:srgbClr val="FFFF00"/>
+                </a:highlight>
+              </a:rPr>
+              <a:t>Share-CDAN</a:t>
+            </a:r>
+            <a:r>
+              <a:rPr lang="fr-FR" sz="1400" dirty="0"/>
+              <a:t>, Share-JGTW, </a:t>
+            </a:r>
+            <a:r>
+              <a:rPr lang="fr-FR" sz="1400" dirty="0">
+                <a:highlight>
+                  <a:srgbClr val="FFFF00"/>
+                </a:highlight>
+              </a:rPr>
+              <a:t>Share-QCTW,</a:t>
+            </a:r>
+            <a:r>
+              <a:rPr lang="fr-FR" sz="1400" dirty="0"/>
+              <a:t> </a:t>
+            </a:r>
+            <a:r>
+              <a:rPr lang="fr-FR" sz="1400" dirty="0">
+                <a:highlight>
+                  <a:srgbClr val="FFFF00"/>
+                </a:highlight>
+              </a:rPr>
+              <a:t>Share-AMXX</a:t>
+            </a:r>
+            <a:r>
+              <a:rPr lang="fr-FR" sz="1400" dirty="0"/>
+              <a:t>, Share-FAPS, Share-LFXB, Share-DWSK, </a:t>
+            </a:r>
+            <a:r>
+              <a:rPr lang="fr-FR" sz="1400" dirty="0">
+                <a:highlight>
+                  <a:srgbClr val="FFFF00"/>
+                </a:highlight>
+              </a:rPr>
+              <a:t>Share-JVCL</a:t>
+            </a:r>
+            <a:r>
+              <a:rPr lang="fr-FR" sz="1400" dirty="0"/>
+              <a:t>, Share-XQII, </a:t>
+            </a:r>
+            <a:r>
+              <a:rPr lang="fr-FR" sz="1400" dirty="0">
+                <a:highlight>
+                  <a:srgbClr val="FFFF00"/>
+                </a:highlight>
+              </a:rPr>
+              <a:t>Share-PVHB</a:t>
+            </a:r>
+            <a:r>
+              <a:rPr lang="fr-FR" sz="1400" dirty="0"/>
+              <a:t>, Share-ROOM</a:t>
+            </a:r>
+          </a:p>
+          <a:p>
+            <a:endParaRPr lang="fr-FR" sz="1400" dirty="0"/>
+          </a:p>
+          <a:p>
+            <a:endParaRPr lang="fr-FR" sz="1400" dirty="0"/>
+          </a:p>
+          <a:p>
+            <a:r>
+              <a:rPr lang="fr-FR" b="1" u="sng" dirty="0"/>
+              <a:t>Prix total :</a:t>
+            </a:r>
+            <a:r>
+              <a:rPr lang="fr-FR" b="1" dirty="0"/>
+              <a:t> </a:t>
+            </a:r>
+            <a:r>
+              <a:rPr lang="fr-FR" dirty="0"/>
+              <a:t>499.99€</a:t>
+            </a:r>
+            <a:endParaRPr lang="fr-FR" b="1" u="sng" dirty="0"/>
+          </a:p>
+          <a:p>
+            <a:r>
+              <a:rPr lang="fr-FR" b="1" u="sng" dirty="0"/>
+              <a:t>Bénéfices après deux ans :</a:t>
+            </a:r>
+            <a:r>
+              <a:rPr lang="fr-FR" b="1" dirty="0"/>
+              <a:t> </a:t>
+            </a:r>
+            <a:r>
+              <a:rPr lang="fr-FR" dirty="0"/>
+              <a:t>198.25€</a:t>
+            </a:r>
+            <a:endParaRPr lang="fr-FR" b="1" u="sng" dirty="0"/>
+          </a:p>
+        </p:txBody>
+      </p:sp>
+      <p:sp>
+        <p:nvSpPr>
+          <p:cNvPr id="5" name="ZoneTexte 4">
+            <a:extLst>
+              <a:ext uri="{FF2B5EF4-FFF2-40B4-BE49-F238E27FC236}">
+                <a16:creationId xmlns:a16="http://schemas.microsoft.com/office/drawing/2014/main" id="{27CF798B-8D23-5E44-8CA9-3FCAE81B699B}"/>
+              </a:ext>
+            </a:extLst>
+          </p:cNvPr>
+          <p:cNvSpPr txBox="1"/>
+          <p:nvPr/>
+        </p:nvSpPr>
+        <p:spPr>
+          <a:xfrm>
+            <a:off x="6329317" y="2061554"/>
+            <a:ext cx="5062451" cy="3350029"/>
+          </a:xfrm>
+          <a:prstGeom prst="rect">
+            <a:avLst/>
+          </a:prstGeom>
+          <a:noFill/>
+          <a:ln w="47625">
+            <a:solidFill>
+              <a:schemeClr val="accent1"/>
+            </a:solidFill>
+          </a:ln>
+        </p:spPr>
+        <p:txBody>
+          <a:bodyPr wrap="square" lIns="251999" tIns="108000" rIns="251999" rtlCol="0">
+            <a:noAutofit/>
+          </a:bodyPr>
+          <a:lstStyle/>
+          <a:p>
+            <a:pPr algn="ctr"/>
+            <a:r>
+              <a:rPr lang="fr-FR" u="sng" dirty="0">
+                <a:latin typeface="+mj-lt"/>
+              </a:rPr>
+              <a:t>Résultats de </a:t>
+            </a:r>
+            <a:r>
+              <a:rPr lang="fr-FR" u="sng" dirty="0" err="1">
+                <a:latin typeface="+mj-lt"/>
+              </a:rPr>
+              <a:t>Sienna</a:t>
+            </a:r>
+            <a:endParaRPr lang="fr-FR" u="sng" dirty="0">
+              <a:latin typeface="+mj-lt"/>
+            </a:endParaRPr>
+          </a:p>
+          <a:p>
+            <a:endParaRPr lang="fr-FR" dirty="0"/>
+          </a:p>
+          <a:p>
+            <a:r>
+              <a:rPr lang="fr-FR" b="1" u="sng" dirty="0"/>
+              <a:t>Actions achetées :</a:t>
+            </a:r>
+            <a:r>
+              <a:rPr lang="fr-FR" b="1" dirty="0"/>
+              <a:t> </a:t>
+            </a:r>
+            <a:r>
+              <a:rPr lang="fr-FR" sz="1400" dirty="0"/>
+              <a:t>Share-ECAQ, Share-IXCI, Share-FWBE, Share-ZOFA, Share-PLLK, </a:t>
+            </a:r>
+            <a:r>
+              <a:rPr lang="fr-FR" sz="1400" dirty="0">
+                <a:highlight>
+                  <a:srgbClr val="FFFF00"/>
+                </a:highlight>
+              </a:rPr>
+              <a:t>Share-YFVZ</a:t>
+            </a:r>
+            <a:r>
+              <a:rPr lang="fr-FR" sz="1400" dirty="0"/>
+              <a:t>, Share-ANFX, Share-PATS, Share-NDKR, Share-ALIY, Share-JWGF, Share-JGTW, Share-FAPS, </a:t>
+            </a:r>
+            <a:r>
+              <a:rPr lang="fr-FR" sz="1400" dirty="0">
+                <a:highlight>
+                  <a:srgbClr val="FFFF00"/>
+                </a:highlight>
+              </a:rPr>
+              <a:t>Share-VCAX</a:t>
+            </a:r>
+            <a:r>
+              <a:rPr lang="fr-FR" sz="1400" dirty="0"/>
+              <a:t>, Share-LFXB, Share-DWSK, Share-XQII, Share-ROOM</a:t>
+            </a:r>
+          </a:p>
+          <a:p>
+            <a:endParaRPr lang="fr-FR" dirty="0"/>
+          </a:p>
+          <a:p>
+            <a:endParaRPr lang="fr-FR" dirty="0"/>
+          </a:p>
+          <a:p>
+            <a:endParaRPr lang="fr-FR" dirty="0"/>
+          </a:p>
+          <a:p>
+            <a:r>
+              <a:rPr lang="fr-FR" b="1" u="sng" dirty="0"/>
+              <a:t>Prix total :</a:t>
+            </a:r>
+            <a:r>
+              <a:rPr lang="fr-FR" b="1" dirty="0"/>
+              <a:t> </a:t>
+            </a:r>
+            <a:r>
+              <a:rPr lang="fr-FR" dirty="0"/>
+              <a:t>489.24€</a:t>
+            </a:r>
+            <a:endParaRPr lang="fr-FR" b="1" u="sng" dirty="0"/>
+          </a:p>
+          <a:p>
+            <a:r>
+              <a:rPr lang="fr-FR" b="1" u="sng" dirty="0"/>
+              <a:t>Bénéfices après deux ans :</a:t>
+            </a:r>
+            <a:r>
+              <a:rPr lang="fr-FR" b="1" dirty="0"/>
+              <a:t> </a:t>
+            </a:r>
+            <a:r>
+              <a:rPr lang="fr-FR" dirty="0"/>
+              <a:t>193.78€</a:t>
+            </a:r>
+            <a:endParaRPr lang="fr-FR" b="1" u="sng" dirty="0"/>
+          </a:p>
+        </p:txBody>
+      </p:sp>
+      <p:sp>
+        <p:nvSpPr>
+          <p:cNvPr id="6" name="ZoneTexte 5">
+            <a:extLst>
+              <a:ext uri="{FF2B5EF4-FFF2-40B4-BE49-F238E27FC236}">
+                <a16:creationId xmlns:a16="http://schemas.microsoft.com/office/drawing/2014/main" id="{A22601B3-CE11-F145-B7E4-FCFD3DFC2F39}"/>
+              </a:ext>
+            </a:extLst>
+          </p:cNvPr>
+          <p:cNvSpPr txBox="1"/>
+          <p:nvPr/>
+        </p:nvSpPr>
+        <p:spPr>
+          <a:xfrm>
+            <a:off x="1169523" y="5553465"/>
+            <a:ext cx="9958367" cy="923330"/>
+          </a:xfrm>
+          <a:prstGeom prst="rect">
+            <a:avLst/>
+          </a:prstGeom>
+          <a:noFill/>
+        </p:spPr>
+        <p:txBody>
+          <a:bodyPr wrap="none" rtlCol="0">
+            <a:spAutoFit/>
+          </a:bodyPr>
+          <a:lstStyle/>
+          <a:p>
+            <a:r>
+              <a:rPr lang="fr-FR" b="1" dirty="0"/>
+              <a:t>En jaune des deux côtés sont les actions que l’autre n’a pas achetées. En retraitant les données du </a:t>
+            </a:r>
+          </a:p>
+          <a:p>
+            <a:r>
+              <a:rPr lang="fr-FR" b="1" dirty="0" err="1"/>
+              <a:t>Dataset</a:t>
+            </a:r>
+            <a:r>
+              <a:rPr lang="fr-FR" b="1" dirty="0"/>
+              <a:t> 2 pour convertir les prix négatifs en positifs, mon algorithme a exploité plus d’actions que </a:t>
+            </a:r>
+          </a:p>
+          <a:p>
+            <a:r>
+              <a:rPr lang="fr-FR" b="1" dirty="0"/>
+              <a:t>celui de Senna. </a:t>
+            </a:r>
+          </a:p>
+        </p:txBody>
+      </p:sp>
+    </p:spTree>
+    <p:extLst>
+      <p:ext uri="{BB962C8B-B14F-4D97-AF65-F5344CB8AC3E}">
+        <p14:creationId xmlns:p14="http://schemas.microsoft.com/office/powerpoint/2010/main" val="832873548"/>
+      </p:ext>
+    </p:extLst>
+  </p:cSld>
+  <p:clrMapOvr>
+    <a:masterClrMapping/>
+  </p:clrMapOvr>
+</p:sld>
+</file>
+
 <file path=ppt/slides/slide2.xml><?xml version="1.0" encoding="utf-8"?>
 <p:sld xmlns:a="http://schemas.openxmlformats.org/drawingml/2006/main" xmlns:r="http://schemas.openxmlformats.org/officeDocument/2006/relationships" xmlns:p="http://schemas.openxmlformats.org/presentationml/2006/main">
   <p:cSld>
@@ -4460,12 +6185,187 @@
             <p:ph idx="1"/>
           </p:nvPr>
         </p:nvSpPr>
-        <p:spPr/>
+        <p:spPr>
+          <a:xfrm>
+            <a:off x="905256" y="1919672"/>
+            <a:ext cx="3146569" cy="4347659"/>
+          </a:xfrm>
+          <a:ln w="47625">
+            <a:solidFill>
+              <a:schemeClr val="accent1"/>
+            </a:solidFill>
+          </a:ln>
+        </p:spPr>
         <p:txBody>
           <a:bodyPr/>
           <a:lstStyle/>
           <a:p>
-            <a:endParaRPr lang="fr-FR"/>
+            <a:pPr marL="0" indent="0" algn="ctr">
+              <a:buNone/>
+            </a:pPr>
+            <a:r>
+              <a:rPr lang="fr-FR" sz="2400" b="1" u="sng" dirty="0">
+                <a:latin typeface="+mj-lt"/>
+              </a:rPr>
+              <a:t>Objectif :</a:t>
+            </a:r>
+          </a:p>
+          <a:p>
+            <a:pPr marL="0" indent="0">
+              <a:buNone/>
+            </a:pPr>
+            <a:r>
+              <a:rPr lang="fr-FR" dirty="0"/>
+              <a:t>Choisir l’ensemble d’actions le plus rentable parmi une liste en respectant un montant de dépenses maximum défini</a:t>
+            </a:r>
+          </a:p>
+        </p:txBody>
+      </p:sp>
+      <p:sp>
+        <p:nvSpPr>
+          <p:cNvPr id="5" name="ZoneTexte 4">
+            <a:extLst>
+              <a:ext uri="{FF2B5EF4-FFF2-40B4-BE49-F238E27FC236}">
+                <a16:creationId xmlns:a16="http://schemas.microsoft.com/office/drawing/2014/main" id="{66A6B319-AC97-FA41-BF1C-0405F33DA744}"/>
+              </a:ext>
+            </a:extLst>
+          </p:cNvPr>
+          <p:cNvSpPr txBox="1"/>
+          <p:nvPr/>
+        </p:nvSpPr>
+        <p:spPr>
+          <a:xfrm>
+            <a:off x="7673546" y="1919673"/>
+            <a:ext cx="3146569" cy="4347658"/>
+          </a:xfrm>
+          <a:prstGeom prst="rect">
+            <a:avLst/>
+          </a:prstGeom>
+          <a:noFill/>
+          <a:ln w="47625">
+            <a:solidFill>
+              <a:schemeClr val="accent1"/>
+            </a:solidFill>
+            <a:round/>
+          </a:ln>
+        </p:spPr>
+        <p:txBody>
+          <a:bodyPr wrap="square" rtlCol="0">
+            <a:noAutofit/>
+          </a:bodyPr>
+          <a:lstStyle/>
+          <a:p>
+            <a:pPr algn="ctr"/>
+            <a:r>
+              <a:rPr lang="fr-FR" sz="2400" b="1" u="sng" dirty="0">
+                <a:latin typeface="+mj-lt"/>
+              </a:rPr>
+              <a:t>Solutions :</a:t>
+            </a:r>
+          </a:p>
+          <a:p>
+            <a:endParaRPr lang="fr-FR" sz="2000" b="1" u="sng" dirty="0">
+              <a:latin typeface="+mj-lt"/>
+            </a:endParaRPr>
+          </a:p>
+          <a:p>
+            <a:pPr marL="342900" indent="-342900">
+              <a:buFontTx/>
+              <a:buChar char="-"/>
+            </a:pPr>
+            <a:r>
+              <a:rPr lang="fr-FR" sz="2000" dirty="0"/>
+              <a:t>Un algorithme  ’’Brute-force’’ avec une approche naïve</a:t>
+            </a:r>
+          </a:p>
+          <a:p>
+            <a:pPr marL="342900" indent="-342900">
+              <a:buFontTx/>
+              <a:buChar char="-"/>
+            </a:pPr>
+            <a:r>
+              <a:rPr lang="fr-FR" sz="2000" dirty="0"/>
+              <a:t>Un algorithme ‘’optimisé’’ avec une approche en programmation dynamique</a:t>
+            </a:r>
+          </a:p>
+        </p:txBody>
+      </p:sp>
+      <p:sp>
+        <p:nvSpPr>
+          <p:cNvPr id="6" name="ZoneTexte 5">
+            <a:extLst>
+              <a:ext uri="{FF2B5EF4-FFF2-40B4-BE49-F238E27FC236}">
+                <a16:creationId xmlns:a16="http://schemas.microsoft.com/office/drawing/2014/main" id="{B19CC0B6-D770-EB4A-B4EF-E82E2A5B07C1}"/>
+              </a:ext>
+            </a:extLst>
+          </p:cNvPr>
+          <p:cNvSpPr txBox="1"/>
+          <p:nvPr/>
+        </p:nvSpPr>
+        <p:spPr>
+          <a:xfrm>
+            <a:off x="4289400" y="1919672"/>
+            <a:ext cx="3146569" cy="4347659"/>
+          </a:xfrm>
+          <a:prstGeom prst="rect">
+            <a:avLst/>
+          </a:prstGeom>
+          <a:noFill/>
+          <a:ln w="47625">
+            <a:solidFill>
+              <a:schemeClr val="accent1"/>
+            </a:solidFill>
+          </a:ln>
+        </p:spPr>
+        <p:txBody>
+          <a:bodyPr wrap="square" rtlCol="0">
+            <a:noAutofit/>
+          </a:bodyPr>
+          <a:lstStyle/>
+          <a:p>
+            <a:pPr algn="ctr"/>
+            <a:r>
+              <a:rPr lang="fr-FR" sz="2400" b="1" u="sng" dirty="0">
+                <a:latin typeface="+mj-lt"/>
+              </a:rPr>
+              <a:t>Contraintes :</a:t>
+            </a:r>
+          </a:p>
+          <a:p>
+            <a:endParaRPr lang="fr-FR" dirty="0"/>
+          </a:p>
+          <a:p>
+            <a:pPr marL="285750" indent="-285750">
+              <a:buFontTx/>
+              <a:buChar char="-"/>
+            </a:pPr>
+            <a:r>
+              <a:rPr lang="fr-FR" sz="2000" dirty="0"/>
+              <a:t>Chaque action ne peut être achetée qu’une seule fois</a:t>
+            </a:r>
+          </a:p>
+          <a:p>
+            <a:pPr marL="285750" indent="-285750">
+              <a:buFontTx/>
+              <a:buChar char="-"/>
+            </a:pPr>
+            <a:r>
+              <a:rPr lang="fr-FR" sz="2000" dirty="0"/>
+              <a:t>Le portefeuille maximum est fixé à 500€</a:t>
+            </a:r>
+          </a:p>
+          <a:p>
+            <a:pPr marL="285750" indent="-285750">
+              <a:buFontTx/>
+              <a:buChar char="-"/>
+            </a:pPr>
+            <a:r>
+              <a:rPr lang="fr-FR" sz="2000" dirty="0"/>
+              <a:t>Les actions ne sont pas divisibles</a:t>
+            </a:r>
+          </a:p>
+          <a:p>
+            <a:endParaRPr lang="fr-FR" dirty="0"/>
           </a:p>
         </p:txBody>
       </p:sp>
@@ -4473,6 +6373,2184 @@
     <p:extLst>
       <p:ext uri="{BB962C8B-B14F-4D97-AF65-F5344CB8AC3E}">
         <p14:creationId xmlns:p14="http://schemas.microsoft.com/office/powerpoint/2010/main" val="3315421776"/>
+      </p:ext>
+    </p:extLst>
+  </p:cSld>
+  <p:clrMapOvr>
+    <a:masterClrMapping/>
+  </p:clrMapOvr>
+</p:sld>
+</file>
+
+<file path=ppt/slides/slide4.xml><?xml version="1.0" encoding="utf-8"?>
+<p:sld xmlns:a="http://schemas.openxmlformats.org/drawingml/2006/main" xmlns:r="http://schemas.openxmlformats.org/officeDocument/2006/relationships" xmlns:p="http://schemas.openxmlformats.org/presentationml/2006/main">
+  <p:cSld>
+    <p:spTree>
+      <p:nvGrpSpPr>
+        <p:cNvPr id="1" name=""/>
+        <p:cNvGrpSpPr/>
+        <p:nvPr/>
+      </p:nvGrpSpPr>
+      <p:grpSpPr>
+        <a:xfrm>
+          <a:off x="0" y="0"/>
+          <a:ext cx="0" cy="0"/>
+          <a:chOff x="0" y="0"/>
+          <a:chExt cx="0" cy="0"/>
+        </a:xfrm>
+      </p:grpSpPr>
+      <p:sp>
+        <p:nvSpPr>
+          <p:cNvPr id="2" name="Titre 1">
+            <a:extLst>
+              <a:ext uri="{FF2B5EF4-FFF2-40B4-BE49-F238E27FC236}">
+                <a16:creationId xmlns:a16="http://schemas.microsoft.com/office/drawing/2014/main" id="{3AAE338A-CD66-7642-8410-84052D13E972}"/>
+              </a:ext>
+            </a:extLst>
+          </p:cNvPr>
+          <p:cNvSpPr>
+            <a:spLocks noGrp="1"/>
+          </p:cNvSpPr>
+          <p:nvPr>
+            <p:ph type="title"/>
+          </p:nvPr>
+        </p:nvSpPr>
+        <p:spPr/>
+        <p:txBody>
+          <a:bodyPr/>
+          <a:lstStyle/>
+          <a:p>
+            <a:r>
+              <a:rPr lang="fr-FR" dirty="0"/>
+              <a:t>Algorithme Brute-Force</a:t>
+            </a:r>
+          </a:p>
+        </p:txBody>
+      </p:sp>
+      <p:sp>
+        <p:nvSpPr>
+          <p:cNvPr id="3" name="Espace réservé du contenu 2">
+            <a:extLst>
+              <a:ext uri="{FF2B5EF4-FFF2-40B4-BE49-F238E27FC236}">
+                <a16:creationId xmlns:a16="http://schemas.microsoft.com/office/drawing/2014/main" id="{5502501B-7F1F-5744-98CA-79E7CE9B56CD}"/>
+              </a:ext>
+            </a:extLst>
+          </p:cNvPr>
+          <p:cNvSpPr>
+            <a:spLocks noGrp="1"/>
+          </p:cNvSpPr>
+          <p:nvPr>
+            <p:ph idx="1"/>
+          </p:nvPr>
+        </p:nvSpPr>
+        <p:spPr/>
+        <p:txBody>
+          <a:bodyPr>
+            <a:normAutofit/>
+          </a:bodyPr>
+          <a:lstStyle/>
+          <a:p>
+            <a:r>
+              <a:rPr lang="fr-FR" sz="2400" dirty="0"/>
+              <a:t>La solution brute force consiste à essayer toutes les combinaisons d’actions possibles et de choisir la plus rentable. </a:t>
+            </a:r>
+          </a:p>
+          <a:p>
+            <a:r>
+              <a:rPr lang="fr-FR" sz="2400" dirty="0"/>
+              <a:t>Cette solution est très gourmande en temps et extrêmement sensible à l’augmentation de N ( nombre d’éléments passés à l’algorithme )</a:t>
+            </a:r>
+          </a:p>
+        </p:txBody>
+      </p:sp>
+    </p:spTree>
+    <p:extLst>
+      <p:ext uri="{BB962C8B-B14F-4D97-AF65-F5344CB8AC3E}">
+        <p14:creationId xmlns:p14="http://schemas.microsoft.com/office/powerpoint/2010/main" val="2258375944"/>
+      </p:ext>
+    </p:extLst>
+  </p:cSld>
+  <p:clrMapOvr>
+    <a:masterClrMapping/>
+  </p:clrMapOvr>
+</p:sld>
+</file>
+
+<file path=ppt/slides/slide5.xml><?xml version="1.0" encoding="utf-8"?>
+<p:sld xmlns:a="http://schemas.openxmlformats.org/drawingml/2006/main" xmlns:r="http://schemas.openxmlformats.org/officeDocument/2006/relationships" xmlns:p="http://schemas.openxmlformats.org/presentationml/2006/main">
+  <p:cSld>
+    <p:spTree>
+      <p:nvGrpSpPr>
+        <p:cNvPr id="1" name=""/>
+        <p:cNvGrpSpPr/>
+        <p:nvPr/>
+      </p:nvGrpSpPr>
+      <p:grpSpPr>
+        <a:xfrm>
+          <a:off x="0" y="0"/>
+          <a:ext cx="0" cy="0"/>
+          <a:chOff x="0" y="0"/>
+          <a:chExt cx="0" cy="0"/>
+        </a:xfrm>
+      </p:grpSpPr>
+      <p:sp>
+        <p:nvSpPr>
+          <p:cNvPr id="2" name="Titre 1">
+            <a:extLst>
+              <a:ext uri="{FF2B5EF4-FFF2-40B4-BE49-F238E27FC236}">
+                <a16:creationId xmlns:a16="http://schemas.microsoft.com/office/drawing/2014/main" id="{59A8620F-89B3-0C42-9285-D801E7E27867}"/>
+              </a:ext>
+            </a:extLst>
+          </p:cNvPr>
+          <p:cNvSpPr>
+            <a:spLocks noGrp="1"/>
+          </p:cNvSpPr>
+          <p:nvPr>
+            <p:ph type="title"/>
+          </p:nvPr>
+        </p:nvSpPr>
+        <p:spPr/>
+        <p:txBody>
+          <a:bodyPr/>
+          <a:lstStyle/>
+          <a:p>
+            <a:r>
+              <a:rPr lang="fr-FR" dirty="0" err="1"/>
+              <a:t>Pseudo-code</a:t>
+            </a:r>
+            <a:r>
+              <a:rPr lang="fr-FR" dirty="0"/>
+              <a:t> Brute-Force</a:t>
+            </a:r>
+          </a:p>
+        </p:txBody>
+      </p:sp>
+      <p:pic>
+        <p:nvPicPr>
+          <p:cNvPr id="4" name="Espace réservé du contenu 3">
+            <a:extLst>
+              <a:ext uri="{FF2B5EF4-FFF2-40B4-BE49-F238E27FC236}">
+                <a16:creationId xmlns:a16="http://schemas.microsoft.com/office/drawing/2014/main" id="{EEA2EB12-69FE-664C-9D61-B5A627746410}"/>
+              </a:ext>
+            </a:extLst>
+          </p:cNvPr>
+          <p:cNvPicPr>
+            <a:picLocks noGrp="1" noChangeAspect="1"/>
+          </p:cNvPicPr>
+          <p:nvPr>
+            <p:ph idx="1"/>
+          </p:nvPr>
+        </p:nvPicPr>
+        <p:blipFill>
+          <a:blip r:embed="rId2"/>
+          <a:stretch>
+            <a:fillRect/>
+          </a:stretch>
+        </p:blipFill>
+        <p:spPr>
+          <a:xfrm>
+            <a:off x="2279650" y="2466723"/>
+            <a:ext cx="7632700" cy="2438400"/>
+          </a:xfrm>
+          <a:prstGeom prst="rect">
+            <a:avLst/>
+          </a:prstGeom>
+          <a:ln w="47625">
+            <a:solidFill>
+              <a:schemeClr val="accent1"/>
+            </a:solidFill>
+          </a:ln>
+        </p:spPr>
+      </p:pic>
+    </p:spTree>
+    <p:extLst>
+      <p:ext uri="{BB962C8B-B14F-4D97-AF65-F5344CB8AC3E}">
+        <p14:creationId xmlns:p14="http://schemas.microsoft.com/office/powerpoint/2010/main" val="4109845012"/>
+      </p:ext>
+    </p:extLst>
+  </p:cSld>
+  <p:clrMapOvr>
+    <a:masterClrMapping/>
+  </p:clrMapOvr>
+</p:sld>
+</file>
+
+<file path=ppt/slides/slide6.xml><?xml version="1.0" encoding="utf-8"?>
+<p:sld xmlns:a="http://schemas.openxmlformats.org/drawingml/2006/main" xmlns:r="http://schemas.openxmlformats.org/officeDocument/2006/relationships" xmlns:p="http://schemas.openxmlformats.org/presentationml/2006/main">
+  <p:cSld>
+    <p:bg>
+      <p:bgPr>
+        <a:solidFill>
+          <a:schemeClr val="bg2"/>
+        </a:solidFill>
+        <a:effectLst/>
+      </p:bgPr>
+    </p:bg>
+    <p:spTree>
+      <p:nvGrpSpPr>
+        <p:cNvPr id="1" name=""/>
+        <p:cNvGrpSpPr/>
+        <p:nvPr/>
+      </p:nvGrpSpPr>
+      <p:grpSpPr>
+        <a:xfrm>
+          <a:off x="0" y="0"/>
+          <a:ext cx="0" cy="0"/>
+          <a:chOff x="0" y="0"/>
+          <a:chExt cx="0" cy="0"/>
+        </a:xfrm>
+      </p:grpSpPr>
+      <p:sp useBgFill="1">
+        <p:nvSpPr>
+          <p:cNvPr id="8" name="Rectangle 7">
+            <a:extLst>
+              <a:ext uri="{FF2B5EF4-FFF2-40B4-BE49-F238E27FC236}">
+                <a16:creationId xmlns:a16="http://schemas.microsoft.com/office/drawing/2014/main" id="{70FF25AD-0F94-41DA-B0CB-8FDC642B706A}"/>
+              </a:ext>
+              <a:ext uri="{C183D7F6-B498-43B3-948B-1728B52AA6E4}">
+                <adec:decorative xmlns:adec="http://schemas.microsoft.com/office/drawing/2017/decorative" val="1"/>
+              </a:ext>
+            </a:extLst>
+          </p:cNvPr>
+          <p:cNvSpPr>
+            <a:spLocks noGrp="1" noRot="1" noChangeAspect="1" noMove="1" noResize="1" noEditPoints="1" noAdjustHandles="1" noChangeArrowheads="1" noChangeShapeType="1" noTextEdit="1"/>
+          </p:cNvSpPr>
+          <p:nvPr>
+            <p:extLst>
+              <p:ext uri="{386F3935-93C4-4BCD-93E2-E3B085C9AB24}">
+                <p16:designElem xmlns:p16="http://schemas.microsoft.com/office/powerpoint/2015/main" val="1"/>
+              </p:ext>
+            </p:extLst>
+          </p:nvPr>
+        </p:nvSpPr>
+        <p:spPr>
+          <a:xfrm>
+            <a:off x="0" y="0"/>
+            <a:ext cx="12192000" cy="6858000"/>
+          </a:xfrm>
+          <a:prstGeom prst="rect">
+            <a:avLst/>
+          </a:prstGeom>
+          <a:ln w="12700" cap="flat" cmpd="sng" algn="ctr">
+            <a:noFill/>
+            <a:prstDash val="solid"/>
+            <a:miter lim="800000"/>
+          </a:ln>
+          <a:effectLst/>
+          <a:extLst>
+            <a:ext uri="{91240B29-F687-4F45-9708-019B960494DF}">
+              <a14:hiddenLine xmlns:a14="http://schemas.microsoft.com/office/drawing/2010/main" w="12700" cap="flat" cmpd="sng" algn="ctr">
+                <a:solidFill>
+                  <a:schemeClr val="accent1">
+                    <a:shade val="50000"/>
+                  </a:schemeClr>
+                </a:solidFill>
+                <a:prstDash val="solid"/>
+                <a:miter lim="800000"/>
+              </a14:hiddenLine>
+            </a:ext>
+          </a:extLst>
+        </p:spPr>
+        <p:style>
+          <a:lnRef idx="2">
+            <a:schemeClr val="accent1">
+              <a:shade val="50000"/>
+            </a:schemeClr>
+          </a:lnRef>
+          <a:fillRef idx="1">
+            <a:schemeClr val="accent1"/>
+          </a:fillRef>
+          <a:effectRef idx="0">
+            <a:schemeClr val="accent1"/>
+          </a:effectRef>
+          <a:fontRef idx="minor">
+            <a:schemeClr val="lt1"/>
+          </a:fontRef>
+        </p:style>
+        <p:txBody>
+          <a:bodyPr rtlCol="0" anchor="ctr"/>
+          <a:lstStyle/>
+          <a:p>
+            <a:pPr algn="ctr"/>
+            <a:endParaRPr lang="en-US"/>
+          </a:p>
+        </p:txBody>
+      </p:sp>
+      <p:sp>
+        <p:nvSpPr>
+          <p:cNvPr id="10" name="Rectangle 9">
+            <a:extLst>
+              <a:ext uri="{FF2B5EF4-FFF2-40B4-BE49-F238E27FC236}">
+                <a16:creationId xmlns:a16="http://schemas.microsoft.com/office/drawing/2014/main" id="{D914EEE2-91CA-464B-AC64-5479DB51338C}"/>
+              </a:ext>
+              <a:ext uri="{C183D7F6-B498-43B3-948B-1728B52AA6E4}">
+                <adec:decorative xmlns:adec="http://schemas.microsoft.com/office/drawing/2017/decorative" val="1"/>
+              </a:ext>
+            </a:extLst>
+          </p:cNvPr>
+          <p:cNvSpPr>
+            <a:spLocks noGrp="1" noRot="1" noChangeAspect="1" noMove="1" noResize="1" noEditPoints="1" noAdjustHandles="1" noChangeArrowheads="1" noChangeShapeType="1" noTextEdit="1"/>
+          </p:cNvSpPr>
+          <p:nvPr>
+            <p:extLst>
+              <p:ext uri="{386F3935-93C4-4BCD-93E2-E3B085C9AB24}">
+                <p16:designElem xmlns:p16="http://schemas.microsoft.com/office/powerpoint/2015/main" val="1"/>
+              </p:ext>
+            </p:extLst>
+          </p:nvPr>
+        </p:nvSpPr>
+        <p:spPr>
+          <a:xfrm>
+            <a:off x="0" y="0"/>
+            <a:ext cx="12192000" cy="2128964"/>
+          </a:xfrm>
+          <a:prstGeom prst="rect">
+            <a:avLst/>
+          </a:prstGeom>
+          <a:solidFill>
+            <a:schemeClr val="accent2"/>
+          </a:solidFill>
+          <a:ln>
+            <a:noFill/>
+          </a:ln>
+        </p:spPr>
+        <p:style>
+          <a:lnRef idx="2">
+            <a:schemeClr val="accent1">
+              <a:shade val="50000"/>
+            </a:schemeClr>
+          </a:lnRef>
+          <a:fillRef idx="1">
+            <a:schemeClr val="accent1"/>
+          </a:fillRef>
+          <a:effectRef idx="0">
+            <a:schemeClr val="accent1"/>
+          </a:effectRef>
+          <a:fontRef idx="minor">
+            <a:schemeClr val="lt1"/>
+          </a:fontRef>
+        </p:style>
+        <p:txBody>
+          <a:bodyPr rtlCol="0" anchor="ctr"/>
+          <a:lstStyle/>
+          <a:p>
+            <a:pPr algn="ctr"/>
+            <a:endParaRPr lang="en-US"/>
+          </a:p>
+        </p:txBody>
+      </p:sp>
+      <p:sp>
+        <p:nvSpPr>
+          <p:cNvPr id="12" name="Freeform: Shape 11">
+            <a:extLst>
+              <a:ext uri="{FF2B5EF4-FFF2-40B4-BE49-F238E27FC236}">
+                <a16:creationId xmlns:a16="http://schemas.microsoft.com/office/drawing/2014/main" id="{6850C165-81F9-4CBC-87CA-3E6EBEA63901}"/>
+              </a:ext>
+              <a:ext uri="{C183D7F6-B498-43B3-948B-1728B52AA6E4}">
+                <adec:decorative xmlns:adec="http://schemas.microsoft.com/office/drawing/2017/decorative" val="1"/>
+              </a:ext>
+            </a:extLst>
+          </p:cNvPr>
+          <p:cNvSpPr>
+            <a:spLocks noGrp="1" noRot="1" noChangeAspect="1" noMove="1" noResize="1" noEditPoints="1" noAdjustHandles="1" noChangeArrowheads="1" noChangeShapeType="1" noTextEdit="1"/>
+          </p:cNvSpPr>
+          <p:nvPr>
+            <p:extLst>
+              <p:ext uri="{386F3935-93C4-4BCD-93E2-E3B085C9AB24}">
+                <p16:designElem xmlns:p16="http://schemas.microsoft.com/office/powerpoint/2015/main" val="1"/>
+              </p:ext>
+            </p:extLst>
+          </p:nvPr>
+        </p:nvSpPr>
+        <p:spPr>
+          <a:xfrm rot="10800000" flipV="1">
+            <a:off x="9860295" y="0"/>
+            <a:ext cx="2343647" cy="4385568"/>
+          </a:xfrm>
+          <a:custGeom>
+            <a:avLst/>
+            <a:gdLst>
+              <a:gd name="connsiteX0" fmla="*/ 0 w 2343647"/>
+              <a:gd name="connsiteY0" fmla="*/ 0 h 4385568"/>
+              <a:gd name="connsiteX1" fmla="*/ 13818 w 2343647"/>
+              <a:gd name="connsiteY1" fmla="*/ 0 h 4385568"/>
+              <a:gd name="connsiteX2" fmla="*/ 34560 w 2343647"/>
+              <a:gd name="connsiteY2" fmla="*/ 141658 h 4385568"/>
+              <a:gd name="connsiteX3" fmla="*/ 2208831 w 2343647"/>
+              <a:gd name="connsiteY3" fmla="*/ 2118828 h 4385568"/>
+              <a:gd name="connsiteX4" fmla="*/ 2343647 w 2343647"/>
+              <a:gd name="connsiteY4" fmla="*/ 2125211 h 4385568"/>
+              <a:gd name="connsiteX5" fmla="*/ 2208831 w 2343647"/>
+              <a:gd name="connsiteY5" fmla="*/ 2131594 h 4385568"/>
+              <a:gd name="connsiteX6" fmla="*/ 3143 w 2343647"/>
+              <a:gd name="connsiteY6" fmla="*/ 4323325 h 4385568"/>
+              <a:gd name="connsiteX7" fmla="*/ 0 w 2343647"/>
+              <a:gd name="connsiteY7" fmla="*/ 4385568 h 4385568"/>
+            </a:gdLst>
+            <a:ahLst/>
+            <a:cxnLst>
+              <a:cxn ang="0">
+                <a:pos x="connsiteX0" y="connsiteY0"/>
+              </a:cxn>
+              <a:cxn ang="0">
+                <a:pos x="connsiteX1" y="connsiteY1"/>
+              </a:cxn>
+              <a:cxn ang="0">
+                <a:pos x="connsiteX2" y="connsiteY2"/>
+              </a:cxn>
+              <a:cxn ang="0">
+                <a:pos x="connsiteX3" y="connsiteY3"/>
+              </a:cxn>
+              <a:cxn ang="0">
+                <a:pos x="connsiteX4" y="connsiteY4"/>
+              </a:cxn>
+              <a:cxn ang="0">
+                <a:pos x="connsiteX5" y="connsiteY5"/>
+              </a:cxn>
+              <a:cxn ang="0">
+                <a:pos x="connsiteX6" y="connsiteY6"/>
+              </a:cxn>
+              <a:cxn ang="0">
+                <a:pos x="connsiteX7" y="connsiteY7"/>
+              </a:cxn>
+            </a:cxnLst>
+            <a:rect l="l" t="t" r="r" b="b"/>
+            <a:pathLst>
+              <a:path w="2343647" h="4385568">
+                <a:moveTo>
+                  <a:pt x="0" y="0"/>
+                </a:moveTo>
+                <a:lnTo>
+                  <a:pt x="13818" y="0"/>
+                </a:lnTo>
+                <a:lnTo>
+                  <a:pt x="34560" y="141658"/>
+                </a:lnTo>
+                <a:cubicBezTo>
+                  <a:pt x="237593" y="1199063"/>
+                  <a:pt x="1119361" y="2015131"/>
+                  <a:pt x="2208831" y="2118828"/>
+                </a:cubicBezTo>
+                <a:lnTo>
+                  <a:pt x="2343647" y="2125211"/>
+                </a:lnTo>
+                <a:lnTo>
+                  <a:pt x="2208831" y="2131594"/>
+                </a:lnTo>
+                <a:cubicBezTo>
+                  <a:pt x="1046730" y="2242204"/>
+                  <a:pt x="120947" y="3163335"/>
+                  <a:pt x="3143" y="4323325"/>
+                </a:cubicBezTo>
+                <a:lnTo>
+                  <a:pt x="0" y="4385568"/>
+                </a:lnTo>
+                <a:close/>
+              </a:path>
+            </a:pathLst>
+          </a:custGeom>
+          <a:solidFill>
+            <a:schemeClr val="accent2"/>
+          </a:solidFill>
+          <a:ln>
+            <a:noFill/>
+          </a:ln>
+        </p:spPr>
+        <p:style>
+          <a:lnRef idx="2">
+            <a:schemeClr val="accent1">
+              <a:shade val="50000"/>
+            </a:schemeClr>
+          </a:lnRef>
+          <a:fillRef idx="1">
+            <a:schemeClr val="accent1"/>
+          </a:fillRef>
+          <a:effectRef idx="0">
+            <a:schemeClr val="accent1"/>
+          </a:effectRef>
+          <a:fontRef idx="minor">
+            <a:schemeClr val="lt1"/>
+          </a:fontRef>
+        </p:style>
+        <p:txBody>
+          <a:bodyPr wrap="square" rtlCol="0" anchor="ctr">
+            <a:noAutofit/>
+          </a:bodyPr>
+          <a:lstStyle/>
+          <a:p>
+            <a:pPr algn="ctr"/>
+            <a:endParaRPr lang="en-US"/>
+          </a:p>
+        </p:txBody>
+      </p:sp>
+      <p:sp>
+        <p:nvSpPr>
+          <p:cNvPr id="14" name="Freeform: Shape 13">
+            <a:extLst>
+              <a:ext uri="{FF2B5EF4-FFF2-40B4-BE49-F238E27FC236}">
+                <a16:creationId xmlns:a16="http://schemas.microsoft.com/office/drawing/2014/main" id="{5C1A212B-431A-4929-AA76-34A688D359DD}"/>
+              </a:ext>
+              <a:ext uri="{C183D7F6-B498-43B3-948B-1728B52AA6E4}">
+                <adec:decorative xmlns:adec="http://schemas.microsoft.com/office/drawing/2017/decorative" val="1"/>
+              </a:ext>
+            </a:extLst>
+          </p:cNvPr>
+          <p:cNvSpPr>
+            <a:spLocks noGrp="1" noRot="1" noChangeAspect="1" noMove="1" noResize="1" noEditPoints="1" noAdjustHandles="1" noChangeArrowheads="1" noChangeShapeType="1" noTextEdit="1"/>
+          </p:cNvSpPr>
+          <p:nvPr>
+            <p:extLst>
+              <p:ext uri="{386F3935-93C4-4BCD-93E2-E3B085C9AB24}">
+                <p16:designElem xmlns:p16="http://schemas.microsoft.com/office/powerpoint/2015/main" val="1"/>
+              </p:ext>
+            </p:extLst>
+          </p:nvPr>
+        </p:nvSpPr>
+        <p:spPr>
+          <a:xfrm rot="10800000" flipV="1">
+            <a:off x="9860295" y="0"/>
+            <a:ext cx="2343647" cy="4385568"/>
+          </a:xfrm>
+          <a:custGeom>
+            <a:avLst/>
+            <a:gdLst>
+              <a:gd name="connsiteX0" fmla="*/ 0 w 2343647"/>
+              <a:gd name="connsiteY0" fmla="*/ 0 h 4385568"/>
+              <a:gd name="connsiteX1" fmla="*/ 13818 w 2343647"/>
+              <a:gd name="connsiteY1" fmla="*/ 0 h 4385568"/>
+              <a:gd name="connsiteX2" fmla="*/ 34560 w 2343647"/>
+              <a:gd name="connsiteY2" fmla="*/ 141658 h 4385568"/>
+              <a:gd name="connsiteX3" fmla="*/ 2208831 w 2343647"/>
+              <a:gd name="connsiteY3" fmla="*/ 2118828 h 4385568"/>
+              <a:gd name="connsiteX4" fmla="*/ 2343647 w 2343647"/>
+              <a:gd name="connsiteY4" fmla="*/ 2125211 h 4385568"/>
+              <a:gd name="connsiteX5" fmla="*/ 2208831 w 2343647"/>
+              <a:gd name="connsiteY5" fmla="*/ 2131594 h 4385568"/>
+              <a:gd name="connsiteX6" fmla="*/ 3143 w 2343647"/>
+              <a:gd name="connsiteY6" fmla="*/ 4323325 h 4385568"/>
+              <a:gd name="connsiteX7" fmla="*/ 0 w 2343647"/>
+              <a:gd name="connsiteY7" fmla="*/ 4385568 h 4385568"/>
+            </a:gdLst>
+            <a:ahLst/>
+            <a:cxnLst>
+              <a:cxn ang="0">
+                <a:pos x="connsiteX0" y="connsiteY0"/>
+              </a:cxn>
+              <a:cxn ang="0">
+                <a:pos x="connsiteX1" y="connsiteY1"/>
+              </a:cxn>
+              <a:cxn ang="0">
+                <a:pos x="connsiteX2" y="connsiteY2"/>
+              </a:cxn>
+              <a:cxn ang="0">
+                <a:pos x="connsiteX3" y="connsiteY3"/>
+              </a:cxn>
+              <a:cxn ang="0">
+                <a:pos x="connsiteX4" y="connsiteY4"/>
+              </a:cxn>
+              <a:cxn ang="0">
+                <a:pos x="connsiteX5" y="connsiteY5"/>
+              </a:cxn>
+              <a:cxn ang="0">
+                <a:pos x="connsiteX6" y="connsiteY6"/>
+              </a:cxn>
+              <a:cxn ang="0">
+                <a:pos x="connsiteX7" y="connsiteY7"/>
+              </a:cxn>
+            </a:cxnLst>
+            <a:rect l="l" t="t" r="r" b="b"/>
+            <a:pathLst>
+              <a:path w="2343647" h="4385568">
+                <a:moveTo>
+                  <a:pt x="0" y="0"/>
+                </a:moveTo>
+                <a:lnTo>
+                  <a:pt x="13818" y="0"/>
+                </a:lnTo>
+                <a:lnTo>
+                  <a:pt x="34560" y="141658"/>
+                </a:lnTo>
+                <a:cubicBezTo>
+                  <a:pt x="237593" y="1199063"/>
+                  <a:pt x="1119361" y="2015131"/>
+                  <a:pt x="2208831" y="2118828"/>
+                </a:cubicBezTo>
+                <a:lnTo>
+                  <a:pt x="2343647" y="2125211"/>
+                </a:lnTo>
+                <a:lnTo>
+                  <a:pt x="2208831" y="2131594"/>
+                </a:lnTo>
+                <a:cubicBezTo>
+                  <a:pt x="1046730" y="2242204"/>
+                  <a:pt x="120947" y="3163335"/>
+                  <a:pt x="3143" y="4323325"/>
+                </a:cubicBezTo>
+                <a:lnTo>
+                  <a:pt x="0" y="4385568"/>
+                </a:lnTo>
+                <a:close/>
+              </a:path>
+            </a:pathLst>
+          </a:custGeom>
+          <a:solidFill>
+            <a:schemeClr val="accent2">
+              <a:lumMod val="75000"/>
+              <a:alpha val="70000"/>
+            </a:schemeClr>
+          </a:solidFill>
+          <a:ln>
+            <a:noFill/>
+          </a:ln>
+        </p:spPr>
+        <p:style>
+          <a:lnRef idx="2">
+            <a:schemeClr val="accent1">
+              <a:shade val="50000"/>
+            </a:schemeClr>
+          </a:lnRef>
+          <a:fillRef idx="1">
+            <a:schemeClr val="accent1"/>
+          </a:fillRef>
+          <a:effectRef idx="0">
+            <a:schemeClr val="accent1"/>
+          </a:effectRef>
+          <a:fontRef idx="minor">
+            <a:schemeClr val="lt1"/>
+          </a:fontRef>
+        </p:style>
+        <p:txBody>
+          <a:bodyPr wrap="square" rtlCol="0" anchor="ctr">
+            <a:noAutofit/>
+          </a:bodyPr>
+          <a:lstStyle/>
+          <a:p>
+            <a:pPr algn="ctr"/>
+            <a:endParaRPr lang="en-US"/>
+          </a:p>
+        </p:txBody>
+      </p:sp>
+      <p:sp>
+        <p:nvSpPr>
+          <p:cNvPr id="2" name="Titre 1">
+            <a:extLst>
+              <a:ext uri="{FF2B5EF4-FFF2-40B4-BE49-F238E27FC236}">
+                <a16:creationId xmlns:a16="http://schemas.microsoft.com/office/drawing/2014/main" id="{CA07F9A5-A685-D74D-9945-9CEE06F7FE22}"/>
+              </a:ext>
+            </a:extLst>
+          </p:cNvPr>
+          <p:cNvSpPr>
+            <a:spLocks noGrp="1"/>
+          </p:cNvSpPr>
+          <p:nvPr>
+            <p:ph type="title"/>
+          </p:nvPr>
+        </p:nvSpPr>
+        <p:spPr>
+          <a:xfrm>
+            <a:off x="914401" y="430307"/>
+            <a:ext cx="9914859" cy="1371600"/>
+          </a:xfrm>
+        </p:spPr>
+        <p:txBody>
+          <a:bodyPr>
+            <a:normAutofit/>
+          </a:bodyPr>
+          <a:lstStyle/>
+          <a:p>
+            <a:r>
+              <a:rPr lang="fr-FR">
+                <a:solidFill>
+                  <a:srgbClr val="FFFFFF"/>
+                </a:solidFill>
+              </a:rPr>
+              <a:t>Analyse Brute-Force</a:t>
+            </a:r>
+          </a:p>
+        </p:txBody>
+      </p:sp>
+      <p:sp>
+        <p:nvSpPr>
+          <p:cNvPr id="3" name="Espace réservé du contenu 2">
+            <a:extLst>
+              <a:ext uri="{FF2B5EF4-FFF2-40B4-BE49-F238E27FC236}">
+                <a16:creationId xmlns:a16="http://schemas.microsoft.com/office/drawing/2014/main" id="{53B856C8-B1A0-DA4B-86C8-469DDAFC70E4}"/>
+              </a:ext>
+            </a:extLst>
+          </p:cNvPr>
+          <p:cNvSpPr>
+            <a:spLocks noGrp="1"/>
+          </p:cNvSpPr>
+          <p:nvPr>
+            <p:ph idx="1"/>
+          </p:nvPr>
+        </p:nvSpPr>
+        <p:spPr>
+          <a:xfrm>
+            <a:off x="914400" y="2810001"/>
+            <a:ext cx="9753600" cy="3366961"/>
+          </a:xfrm>
+        </p:spPr>
+        <p:txBody>
+          <a:bodyPr>
+            <a:normAutofit/>
+          </a:bodyPr>
+          <a:lstStyle/>
+          <a:p>
+            <a:r>
+              <a:rPr lang="fr-FR" b="1" u="sng" dirty="0">
+                <a:latin typeface="+mj-lt"/>
+              </a:rPr>
+              <a:t>Analyse temporelle : </a:t>
+            </a:r>
+          </a:p>
+          <a:p>
+            <a:pPr marL="0" indent="0">
+              <a:buNone/>
+            </a:pPr>
+            <a:r>
+              <a:rPr lang="fr-FR" dirty="0"/>
+              <a:t>L’algorithme Brute-Force itère </a:t>
+            </a:r>
+            <a:r>
+              <a:rPr lang="fr-FR" b="1" dirty="0"/>
+              <a:t>n</a:t>
+            </a:r>
+            <a:r>
+              <a:rPr lang="fr-FR" dirty="0"/>
+              <a:t> ( nombre d’éléments passés dans l’algorithme ) fois sur la fonctionne </a:t>
+            </a:r>
+            <a:r>
+              <a:rPr lang="fr-FR" dirty="0" err="1"/>
+              <a:t>itertools.combinaison</a:t>
+            </a:r>
+            <a:r>
+              <a:rPr lang="fr-FR" dirty="0"/>
+              <a:t> dont la complexité temporelle est </a:t>
+            </a:r>
+            <a:r>
+              <a:rPr lang="fr-FR" b="1" dirty="0"/>
+              <a:t>O(n!)</a:t>
+            </a:r>
+          </a:p>
+          <a:p>
+            <a:pPr marL="0" indent="0">
+              <a:buNone/>
+            </a:pPr>
+            <a:r>
+              <a:rPr lang="fr-FR" dirty="0"/>
+              <a:t>La complexité temporelle est donc </a:t>
+            </a:r>
+            <a:r>
+              <a:rPr lang="fr-FR" b="1" dirty="0"/>
+              <a:t>n*n!</a:t>
+            </a:r>
+            <a:r>
+              <a:rPr lang="fr-FR" dirty="0"/>
+              <a:t> soit </a:t>
+            </a:r>
+            <a:r>
+              <a:rPr lang="fr-FR" b="1" dirty="0"/>
+              <a:t>O(n!) </a:t>
+            </a:r>
+            <a:r>
+              <a:rPr lang="fr-FR" dirty="0"/>
+              <a:t>selon la notation </a:t>
+            </a:r>
+            <a:r>
+              <a:rPr lang="fr-FR" dirty="0" err="1"/>
+              <a:t>BigO</a:t>
+            </a:r>
+            <a:endParaRPr lang="fr-FR" dirty="0"/>
+          </a:p>
+          <a:p>
+            <a:r>
+              <a:rPr lang="fr-FR" b="1" u="sng" dirty="0">
+                <a:latin typeface="+mj-lt"/>
+              </a:rPr>
+              <a:t>Analyse de la mémoire : </a:t>
+            </a:r>
+          </a:p>
+          <a:p>
+            <a:pPr marL="0" indent="0">
+              <a:buNone/>
+            </a:pPr>
+            <a:r>
+              <a:rPr lang="fr-FR" dirty="0"/>
+              <a:t>L’algorithme crée n liste de complexité spatiale </a:t>
+            </a:r>
+            <a:r>
+              <a:rPr lang="fr-FR" b="1" dirty="0"/>
+              <a:t>O(n)</a:t>
+            </a:r>
+            <a:r>
+              <a:rPr lang="fr-FR" dirty="0"/>
+              <a:t>, sa complexité spatiale est donc de </a:t>
+            </a:r>
+            <a:r>
+              <a:rPr lang="fr-FR" b="1" dirty="0"/>
+              <a:t>O(n^2).</a:t>
+            </a:r>
+          </a:p>
+        </p:txBody>
+      </p:sp>
+    </p:spTree>
+    <p:extLst>
+      <p:ext uri="{BB962C8B-B14F-4D97-AF65-F5344CB8AC3E}">
+        <p14:creationId xmlns:p14="http://schemas.microsoft.com/office/powerpoint/2010/main" val="1845037917"/>
+      </p:ext>
+    </p:extLst>
+  </p:cSld>
+  <p:clrMapOvr>
+    <a:masterClrMapping/>
+  </p:clrMapOvr>
+</p:sld>
+</file>
+
+<file path=ppt/slides/slide7.xml><?xml version="1.0" encoding="utf-8"?>
+<p:sld xmlns:a="http://schemas.openxmlformats.org/drawingml/2006/main" xmlns:r="http://schemas.openxmlformats.org/officeDocument/2006/relationships" xmlns:p="http://schemas.openxmlformats.org/presentationml/2006/main">
+  <p:cSld>
+    <p:spTree>
+      <p:nvGrpSpPr>
+        <p:cNvPr id="1" name=""/>
+        <p:cNvGrpSpPr/>
+        <p:nvPr/>
+      </p:nvGrpSpPr>
+      <p:grpSpPr>
+        <a:xfrm>
+          <a:off x="0" y="0"/>
+          <a:ext cx="0" cy="0"/>
+          <a:chOff x="0" y="0"/>
+          <a:chExt cx="0" cy="0"/>
+        </a:xfrm>
+      </p:grpSpPr>
+      <p:sp>
+        <p:nvSpPr>
+          <p:cNvPr id="2" name="Titre 1">
+            <a:extLst>
+              <a:ext uri="{FF2B5EF4-FFF2-40B4-BE49-F238E27FC236}">
+                <a16:creationId xmlns:a16="http://schemas.microsoft.com/office/drawing/2014/main" id="{91F18DD6-E56E-2540-B336-24B3FC2A0A91}"/>
+              </a:ext>
+            </a:extLst>
+          </p:cNvPr>
+          <p:cNvSpPr>
+            <a:spLocks noGrp="1"/>
+          </p:cNvSpPr>
+          <p:nvPr>
+            <p:ph type="title"/>
+          </p:nvPr>
+        </p:nvSpPr>
+        <p:spPr/>
+        <p:txBody>
+          <a:bodyPr/>
+          <a:lstStyle/>
+          <a:p>
+            <a:r>
+              <a:rPr lang="fr-FR" dirty="0"/>
+              <a:t>Résultats Brute-Force</a:t>
+            </a:r>
+          </a:p>
+        </p:txBody>
+      </p:sp>
+      <p:pic>
+        <p:nvPicPr>
+          <p:cNvPr id="4" name="Espace réservé du contenu 3">
+            <a:extLst>
+              <a:ext uri="{FF2B5EF4-FFF2-40B4-BE49-F238E27FC236}">
+                <a16:creationId xmlns:a16="http://schemas.microsoft.com/office/drawing/2014/main" id="{F4FF20C6-4F9A-224B-A8AE-55784DD350F1}"/>
+              </a:ext>
+            </a:extLst>
+          </p:cNvPr>
+          <p:cNvPicPr>
+            <a:picLocks noGrp="1" noChangeAspect="1"/>
+          </p:cNvPicPr>
+          <p:nvPr>
+            <p:ph idx="1"/>
+          </p:nvPr>
+        </p:nvPicPr>
+        <p:blipFill>
+          <a:blip r:embed="rId2"/>
+          <a:stretch>
+            <a:fillRect/>
+          </a:stretch>
+        </p:blipFill>
+        <p:spPr>
+          <a:xfrm>
+            <a:off x="659598" y="2167958"/>
+            <a:ext cx="10872803" cy="1329004"/>
+          </a:xfrm>
+          <a:prstGeom prst="rect">
+            <a:avLst/>
+          </a:prstGeom>
+        </p:spPr>
+      </p:pic>
+      <p:sp>
+        <p:nvSpPr>
+          <p:cNvPr id="5" name="ZoneTexte 4">
+            <a:extLst>
+              <a:ext uri="{FF2B5EF4-FFF2-40B4-BE49-F238E27FC236}">
+                <a16:creationId xmlns:a16="http://schemas.microsoft.com/office/drawing/2014/main" id="{9C383A35-4A6A-2C4C-B0B9-12D2B9C8D2D2}"/>
+              </a:ext>
+            </a:extLst>
+          </p:cNvPr>
+          <p:cNvSpPr txBox="1"/>
+          <p:nvPr/>
+        </p:nvSpPr>
+        <p:spPr>
+          <a:xfrm>
+            <a:off x="905256" y="4263082"/>
+            <a:ext cx="7982465" cy="1631216"/>
+          </a:xfrm>
+          <a:prstGeom prst="rect">
+            <a:avLst/>
+          </a:prstGeom>
+          <a:noFill/>
+        </p:spPr>
+        <p:txBody>
+          <a:bodyPr wrap="square" rtlCol="0">
+            <a:spAutoFit/>
+          </a:bodyPr>
+          <a:lstStyle/>
+          <a:p>
+            <a:pPr marL="285750" indent="-285750">
+              <a:buFont typeface="Wingdings" pitchFamily="2" charset="2"/>
+              <a:buChar char="§"/>
+            </a:pPr>
+            <a:r>
+              <a:rPr lang="fr-FR" sz="2000" dirty="0"/>
+              <a:t>Le total des profits est de 99,08€ après deux ans</a:t>
+            </a:r>
+          </a:p>
+          <a:p>
+            <a:pPr marL="285750" indent="-285750">
+              <a:buFont typeface="Wingdings" pitchFamily="2" charset="2"/>
+              <a:buChar char="§"/>
+            </a:pPr>
+            <a:r>
+              <a:rPr lang="fr-FR" sz="2000" dirty="0"/>
+              <a:t>Le prix total est de 498€</a:t>
+            </a:r>
+          </a:p>
+          <a:p>
+            <a:pPr marL="285750" indent="-285750">
+              <a:buFont typeface="Wingdings" pitchFamily="2" charset="2"/>
+              <a:buChar char="§"/>
+            </a:pPr>
+            <a:r>
+              <a:rPr lang="fr-FR" sz="2000" dirty="0"/>
+              <a:t>L’algorithme met 1,77sec à trouver la solution pour ce premier </a:t>
+            </a:r>
+            <a:r>
+              <a:rPr lang="fr-FR" sz="2000" dirty="0" err="1"/>
+              <a:t>dataset</a:t>
+            </a:r>
+            <a:endParaRPr lang="fr-FR" sz="2000" dirty="0"/>
+          </a:p>
+          <a:p>
+            <a:pPr marL="285750" indent="-285750">
+              <a:buFont typeface="Wingdings" pitchFamily="2" charset="2"/>
+              <a:buChar char="§"/>
+            </a:pPr>
+            <a:endParaRPr lang="fr-FR" sz="2000" dirty="0"/>
+          </a:p>
+        </p:txBody>
+      </p:sp>
+    </p:spTree>
+    <p:extLst>
+      <p:ext uri="{BB962C8B-B14F-4D97-AF65-F5344CB8AC3E}">
+        <p14:creationId xmlns:p14="http://schemas.microsoft.com/office/powerpoint/2010/main" val="2243267039"/>
+      </p:ext>
+    </p:extLst>
+  </p:cSld>
+  <p:clrMapOvr>
+    <a:masterClrMapping/>
+  </p:clrMapOvr>
+</p:sld>
+</file>
+
+<file path=ppt/slides/slide8.xml><?xml version="1.0" encoding="utf-8"?>
+<p:sld xmlns:a="http://schemas.openxmlformats.org/drawingml/2006/main" xmlns:r="http://schemas.openxmlformats.org/officeDocument/2006/relationships" xmlns:p="http://schemas.openxmlformats.org/presentationml/2006/main">
+  <p:cSld>
+    <p:bg>
+      <p:bgPr>
+        <a:solidFill>
+          <a:schemeClr val="bg2"/>
+        </a:solidFill>
+        <a:effectLst/>
+      </p:bgPr>
+    </p:bg>
+    <p:spTree>
+      <p:nvGrpSpPr>
+        <p:cNvPr id="1" name=""/>
+        <p:cNvGrpSpPr/>
+        <p:nvPr/>
+      </p:nvGrpSpPr>
+      <p:grpSpPr>
+        <a:xfrm>
+          <a:off x="0" y="0"/>
+          <a:ext cx="0" cy="0"/>
+          <a:chOff x="0" y="0"/>
+          <a:chExt cx="0" cy="0"/>
+        </a:xfrm>
+      </p:grpSpPr>
+      <p:sp useBgFill="1">
+        <p:nvSpPr>
+          <p:cNvPr id="9" name="Rectangle 8">
+            <a:extLst>
+              <a:ext uri="{FF2B5EF4-FFF2-40B4-BE49-F238E27FC236}">
+                <a16:creationId xmlns:a16="http://schemas.microsoft.com/office/drawing/2014/main" id="{8354E4A1-6024-4D18-89EA-EB7EF53D340F}"/>
+              </a:ext>
+              <a:ext uri="{C183D7F6-B498-43B3-948B-1728B52AA6E4}">
+                <adec:decorative xmlns:adec="http://schemas.microsoft.com/office/drawing/2017/decorative" val="1"/>
+              </a:ext>
+            </a:extLst>
+          </p:cNvPr>
+          <p:cNvSpPr>
+            <a:spLocks noGrp="1" noRot="1" noChangeAspect="1" noMove="1" noResize="1" noEditPoints="1" noAdjustHandles="1" noChangeArrowheads="1" noChangeShapeType="1" noTextEdit="1"/>
+          </p:cNvSpPr>
+          <p:nvPr>
+            <p:extLst>
+              <p:ext uri="{386F3935-93C4-4BCD-93E2-E3B085C9AB24}">
+                <p16:designElem xmlns:p16="http://schemas.microsoft.com/office/powerpoint/2015/main" val="1"/>
+              </p:ext>
+            </p:extLst>
+          </p:nvPr>
+        </p:nvSpPr>
+        <p:spPr>
+          <a:xfrm>
+            <a:off x="0" y="0"/>
+            <a:ext cx="12192000" cy="6858000"/>
+          </a:xfrm>
+          <a:prstGeom prst="rect">
+            <a:avLst/>
+          </a:prstGeom>
+          <a:ln w="12700" cap="flat" cmpd="sng" algn="ctr">
+            <a:noFill/>
+            <a:prstDash val="solid"/>
+            <a:miter lim="800000"/>
+          </a:ln>
+          <a:effectLst/>
+          <a:extLst>
+            <a:ext uri="{91240B29-F687-4F45-9708-019B960494DF}">
+              <a14:hiddenLine xmlns:a14="http://schemas.microsoft.com/office/drawing/2010/main" w="12700" cap="flat" cmpd="sng" algn="ctr">
+                <a:solidFill>
+                  <a:schemeClr val="accent1">
+                    <a:shade val="50000"/>
+                  </a:schemeClr>
+                </a:solidFill>
+                <a:prstDash val="solid"/>
+                <a:miter lim="800000"/>
+              </a14:hiddenLine>
+            </a:ext>
+          </a:extLst>
+        </p:spPr>
+        <p:style>
+          <a:lnRef idx="2">
+            <a:schemeClr val="accent1">
+              <a:shade val="50000"/>
+            </a:schemeClr>
+          </a:lnRef>
+          <a:fillRef idx="1">
+            <a:schemeClr val="accent1"/>
+          </a:fillRef>
+          <a:effectRef idx="0">
+            <a:schemeClr val="accent1"/>
+          </a:effectRef>
+          <a:fontRef idx="minor">
+            <a:schemeClr val="lt1"/>
+          </a:fontRef>
+        </p:style>
+        <p:txBody>
+          <a:bodyPr rtlCol="0" anchor="ctr"/>
+          <a:lstStyle/>
+          <a:p>
+            <a:pPr algn="ctr"/>
+            <a:endParaRPr lang="en-US"/>
+          </a:p>
+        </p:txBody>
+      </p:sp>
+      <p:sp>
+        <p:nvSpPr>
+          <p:cNvPr id="11" name="Freeform: Shape 10">
+            <a:extLst>
+              <a:ext uri="{FF2B5EF4-FFF2-40B4-BE49-F238E27FC236}">
+                <a16:creationId xmlns:a16="http://schemas.microsoft.com/office/drawing/2014/main" id="{184965AF-C953-45C8-BD68-12F8B58810A6}"/>
+              </a:ext>
+              <a:ext uri="{C183D7F6-B498-43B3-948B-1728B52AA6E4}">
+                <adec:decorative xmlns:adec="http://schemas.microsoft.com/office/drawing/2017/decorative" val="1"/>
+              </a:ext>
+            </a:extLst>
+          </p:cNvPr>
+          <p:cNvSpPr>
+            <a:spLocks noGrp="1" noRot="1" noChangeAspect="1" noMove="1" noResize="1" noEditPoints="1" noAdjustHandles="1" noChangeArrowheads="1" noChangeShapeType="1" noTextEdit="1"/>
+          </p:cNvSpPr>
+          <p:nvPr>
+            <p:extLst>
+              <p:ext uri="{386F3935-93C4-4BCD-93E2-E3B085C9AB24}">
+                <p16:designElem xmlns:p16="http://schemas.microsoft.com/office/powerpoint/2015/main" val="1"/>
+              </p:ext>
+            </p:extLst>
+          </p:nvPr>
+        </p:nvSpPr>
+        <p:spPr>
+          <a:xfrm flipH="1">
+            <a:off x="5156" y="0"/>
+            <a:ext cx="12186844" cy="2128964"/>
+          </a:xfrm>
+          <a:custGeom>
+            <a:avLst/>
+            <a:gdLst>
+              <a:gd name="connsiteX0" fmla="*/ 0 w 12186844"/>
+              <a:gd name="connsiteY0" fmla="*/ 0 h 2128964"/>
+              <a:gd name="connsiteX1" fmla="*/ 12186844 w 12186844"/>
+              <a:gd name="connsiteY1" fmla="*/ 0 h 2128964"/>
+              <a:gd name="connsiteX2" fmla="*/ 12186844 w 12186844"/>
+              <a:gd name="connsiteY2" fmla="*/ 2128964 h 2128964"/>
+              <a:gd name="connsiteX3" fmla="*/ 2247277 w 12186844"/>
+              <a:gd name="connsiteY3" fmla="*/ 2128964 h 2128964"/>
+              <a:gd name="connsiteX4" fmla="*/ 2326545 w 12186844"/>
+              <a:gd name="connsiteY4" fmla="*/ 2125211 h 2128964"/>
+              <a:gd name="connsiteX5" fmla="*/ 2191729 w 12186844"/>
+              <a:gd name="connsiteY5" fmla="*/ 2118828 h 2128964"/>
+              <a:gd name="connsiteX6" fmla="*/ 66975 w 12186844"/>
+              <a:gd name="connsiteY6" fmla="*/ 349781 h 2128964"/>
+            </a:gdLst>
+            <a:ahLst/>
+            <a:cxnLst>
+              <a:cxn ang="0">
+                <a:pos x="connsiteX0" y="connsiteY0"/>
+              </a:cxn>
+              <a:cxn ang="0">
+                <a:pos x="connsiteX1" y="connsiteY1"/>
+              </a:cxn>
+              <a:cxn ang="0">
+                <a:pos x="connsiteX2" y="connsiteY2"/>
+              </a:cxn>
+              <a:cxn ang="0">
+                <a:pos x="connsiteX3" y="connsiteY3"/>
+              </a:cxn>
+              <a:cxn ang="0">
+                <a:pos x="connsiteX4" y="connsiteY4"/>
+              </a:cxn>
+              <a:cxn ang="0">
+                <a:pos x="connsiteX5" y="connsiteY5"/>
+              </a:cxn>
+              <a:cxn ang="0">
+                <a:pos x="connsiteX6" y="connsiteY6"/>
+              </a:cxn>
+            </a:cxnLst>
+            <a:rect l="l" t="t" r="r" b="b"/>
+            <a:pathLst>
+              <a:path w="12186844" h="2128964">
+                <a:moveTo>
+                  <a:pt x="0" y="0"/>
+                </a:moveTo>
+                <a:lnTo>
+                  <a:pt x="12186844" y="0"/>
+                </a:lnTo>
+                <a:lnTo>
+                  <a:pt x="12186844" y="2128964"/>
+                </a:lnTo>
+                <a:lnTo>
+                  <a:pt x="2247277" y="2128964"/>
+                </a:lnTo>
+                <a:lnTo>
+                  <a:pt x="2326545" y="2125211"/>
+                </a:lnTo>
+                <a:lnTo>
+                  <a:pt x="2191729" y="2118828"/>
+                </a:lnTo>
+                <a:cubicBezTo>
+                  <a:pt x="1174891" y="2022044"/>
+                  <a:pt x="338983" y="1304706"/>
+                  <a:pt x="66975" y="349781"/>
+                </a:cubicBezTo>
+                <a:close/>
+              </a:path>
+            </a:pathLst>
+          </a:custGeom>
+          <a:solidFill>
+            <a:schemeClr val="accent2"/>
+          </a:solidFill>
+          <a:ln>
+            <a:noFill/>
+          </a:ln>
+        </p:spPr>
+        <p:style>
+          <a:lnRef idx="2">
+            <a:schemeClr val="accent1">
+              <a:shade val="50000"/>
+            </a:schemeClr>
+          </a:lnRef>
+          <a:fillRef idx="1">
+            <a:schemeClr val="accent1"/>
+          </a:fillRef>
+          <a:effectRef idx="0">
+            <a:schemeClr val="accent1"/>
+          </a:effectRef>
+          <a:fontRef idx="minor">
+            <a:schemeClr val="lt1"/>
+          </a:fontRef>
+        </p:style>
+        <p:txBody>
+          <a:bodyPr wrap="square" rtlCol="0" anchor="ctr">
+            <a:noAutofit/>
+          </a:bodyPr>
+          <a:lstStyle/>
+          <a:p>
+            <a:pPr algn="ctr"/>
+            <a:endParaRPr lang="en-US"/>
+          </a:p>
+        </p:txBody>
+      </p:sp>
+      <p:sp>
+        <p:nvSpPr>
+          <p:cNvPr id="13" name="Freeform: Shape 12">
+            <a:extLst>
+              <a:ext uri="{FF2B5EF4-FFF2-40B4-BE49-F238E27FC236}">
+                <a16:creationId xmlns:a16="http://schemas.microsoft.com/office/drawing/2014/main" id="{2DECE677-C1FD-4829-8D4A-3C19A04A3659}"/>
+              </a:ext>
+              <a:ext uri="{C183D7F6-B498-43B3-948B-1728B52AA6E4}">
+                <adec:decorative xmlns:adec="http://schemas.microsoft.com/office/drawing/2017/decorative" val="1"/>
+              </a:ext>
+            </a:extLst>
+          </p:cNvPr>
+          <p:cNvSpPr>
+            <a:spLocks noGrp="1" noRot="1" noChangeAspect="1" noMove="1" noResize="1" noEditPoints="1" noAdjustHandles="1" noChangeArrowheads="1" noChangeShapeType="1" noTextEdit="1"/>
+          </p:cNvSpPr>
+          <p:nvPr>
+            <p:extLst>
+              <p:ext uri="{386F3935-93C4-4BCD-93E2-E3B085C9AB24}">
+                <p16:designElem xmlns:p16="http://schemas.microsoft.com/office/powerpoint/2015/main" val="1"/>
+              </p:ext>
+            </p:extLst>
+          </p:nvPr>
+        </p:nvSpPr>
+        <p:spPr>
+          <a:xfrm>
+            <a:off x="9833672" y="0"/>
+            <a:ext cx="2353172" cy="2431959"/>
+          </a:xfrm>
+          <a:custGeom>
+            <a:avLst/>
+            <a:gdLst>
+              <a:gd name="connsiteX0" fmla="*/ 0 w 2353172"/>
+              <a:gd name="connsiteY0" fmla="*/ 0 h 2431959"/>
+              <a:gd name="connsiteX1" fmla="*/ 2353172 w 2353172"/>
+              <a:gd name="connsiteY1" fmla="*/ 0 h 2431959"/>
+              <a:gd name="connsiteX2" fmla="*/ 2353172 w 2353172"/>
+              <a:gd name="connsiteY2" fmla="*/ 2431959 h 2431959"/>
+              <a:gd name="connsiteX3" fmla="*/ 2352312 w 2353172"/>
+              <a:gd name="connsiteY3" fmla="*/ 2431959 h 2431959"/>
+              <a:gd name="connsiteX4" fmla="*/ 2340504 w 2353172"/>
+              <a:gd name="connsiteY4" fmla="*/ 2198113 h 2431959"/>
+              <a:gd name="connsiteX5" fmla="*/ 134816 w 2353172"/>
+              <a:gd name="connsiteY5" fmla="*/ 6383 h 2431959"/>
+            </a:gdLst>
+            <a:ahLst/>
+            <a:cxnLst>
+              <a:cxn ang="0">
+                <a:pos x="connsiteX0" y="connsiteY0"/>
+              </a:cxn>
+              <a:cxn ang="0">
+                <a:pos x="connsiteX1" y="connsiteY1"/>
+              </a:cxn>
+              <a:cxn ang="0">
+                <a:pos x="connsiteX2" y="connsiteY2"/>
+              </a:cxn>
+              <a:cxn ang="0">
+                <a:pos x="connsiteX3" y="connsiteY3"/>
+              </a:cxn>
+              <a:cxn ang="0">
+                <a:pos x="connsiteX4" y="connsiteY4"/>
+              </a:cxn>
+              <a:cxn ang="0">
+                <a:pos x="connsiteX5" y="connsiteY5"/>
+              </a:cxn>
+            </a:cxnLst>
+            <a:rect l="l" t="t" r="r" b="b"/>
+            <a:pathLst>
+              <a:path w="2353172" h="2431959">
+                <a:moveTo>
+                  <a:pt x="0" y="0"/>
+                </a:moveTo>
+                <a:lnTo>
+                  <a:pt x="2353172" y="0"/>
+                </a:lnTo>
+                <a:lnTo>
+                  <a:pt x="2353172" y="2431959"/>
+                </a:lnTo>
+                <a:lnTo>
+                  <a:pt x="2352312" y="2431959"/>
+                </a:lnTo>
+                <a:lnTo>
+                  <a:pt x="2340504" y="2198113"/>
+                </a:lnTo>
+                <a:cubicBezTo>
+                  <a:pt x="2222700" y="1038123"/>
+                  <a:pt x="1296917" y="116993"/>
+                  <a:pt x="134816" y="6383"/>
+                </a:cubicBezTo>
+                <a:close/>
+              </a:path>
+            </a:pathLst>
+          </a:custGeom>
+          <a:solidFill>
+            <a:schemeClr val="accent2">
+              <a:lumMod val="75000"/>
+              <a:alpha val="70000"/>
+            </a:schemeClr>
+          </a:solidFill>
+          <a:ln>
+            <a:noFill/>
+          </a:ln>
+        </p:spPr>
+        <p:style>
+          <a:lnRef idx="2">
+            <a:schemeClr val="accent1">
+              <a:shade val="50000"/>
+            </a:schemeClr>
+          </a:lnRef>
+          <a:fillRef idx="1">
+            <a:schemeClr val="accent1"/>
+          </a:fillRef>
+          <a:effectRef idx="0">
+            <a:schemeClr val="accent1"/>
+          </a:effectRef>
+          <a:fontRef idx="minor">
+            <a:schemeClr val="lt1"/>
+          </a:fontRef>
+        </p:style>
+        <p:txBody>
+          <a:bodyPr wrap="square" rtlCol="0" anchor="ctr">
+            <a:noAutofit/>
+          </a:bodyPr>
+          <a:lstStyle/>
+          <a:p>
+            <a:pPr algn="ctr"/>
+            <a:endParaRPr lang="en-US"/>
+          </a:p>
+        </p:txBody>
+      </p:sp>
+      <p:sp>
+        <p:nvSpPr>
+          <p:cNvPr id="2" name="Titre 1">
+            <a:extLst>
+              <a:ext uri="{FF2B5EF4-FFF2-40B4-BE49-F238E27FC236}">
+                <a16:creationId xmlns:a16="http://schemas.microsoft.com/office/drawing/2014/main" id="{1803476F-A986-B54D-A2B2-C56DCF919C30}"/>
+              </a:ext>
+            </a:extLst>
+          </p:cNvPr>
+          <p:cNvSpPr>
+            <a:spLocks noGrp="1"/>
+          </p:cNvSpPr>
+          <p:nvPr>
+            <p:ph type="title"/>
+          </p:nvPr>
+        </p:nvSpPr>
+        <p:spPr>
+          <a:xfrm>
+            <a:off x="914400" y="510988"/>
+            <a:ext cx="9344578" cy="1156448"/>
+          </a:xfrm>
+        </p:spPr>
+        <p:txBody>
+          <a:bodyPr>
+            <a:normAutofit/>
+          </a:bodyPr>
+          <a:lstStyle/>
+          <a:p>
+            <a:r>
+              <a:rPr lang="fr-FR">
+                <a:solidFill>
+                  <a:srgbClr val="FFFFFF"/>
+                </a:solidFill>
+              </a:rPr>
+              <a:t>Algorithme optimisé</a:t>
+            </a:r>
+          </a:p>
+        </p:txBody>
+      </p:sp>
+      <p:sp>
+        <p:nvSpPr>
+          <p:cNvPr id="3" name="Espace réservé du contenu 2">
+            <a:extLst>
+              <a:ext uri="{FF2B5EF4-FFF2-40B4-BE49-F238E27FC236}">
+                <a16:creationId xmlns:a16="http://schemas.microsoft.com/office/drawing/2014/main" id="{A5E312C1-2281-E746-A18E-FED2CB18BB33}"/>
+              </a:ext>
+            </a:extLst>
+          </p:cNvPr>
+          <p:cNvSpPr>
+            <a:spLocks noGrp="1"/>
+          </p:cNvSpPr>
+          <p:nvPr>
+            <p:ph idx="1"/>
+          </p:nvPr>
+        </p:nvSpPr>
+        <p:spPr>
+          <a:xfrm>
+            <a:off x="914400" y="2593074"/>
+            <a:ext cx="5589767" cy="3579126"/>
+          </a:xfrm>
+        </p:spPr>
+        <p:txBody>
+          <a:bodyPr>
+            <a:normAutofit/>
+          </a:bodyPr>
+          <a:lstStyle/>
+          <a:p>
+            <a:r>
+              <a:rPr lang="fr-FR" dirty="0"/>
+              <a:t>La solution optimisée s’appuie sur le principe de la </a:t>
+            </a:r>
+            <a:r>
+              <a:rPr lang="fr-FR" b="1"/>
+              <a:t>programmation dynamique</a:t>
+            </a:r>
+            <a:r>
+              <a:rPr lang="fr-FR" dirty="0"/>
+              <a:t>. </a:t>
+            </a:r>
+            <a:endParaRPr lang="fr-FR" b="1" dirty="0"/>
+          </a:p>
+          <a:p>
+            <a:r>
+              <a:rPr lang="fr-FR" dirty="0"/>
+              <a:t>L’algorithme va créer une </a:t>
+            </a:r>
+            <a:r>
+              <a:rPr lang="fr-FR" b="1"/>
+              <a:t>table</a:t>
+            </a:r>
+            <a:r>
+              <a:rPr lang="fr-FR" dirty="0"/>
+              <a:t> pour stocker la solution de chaque </a:t>
+            </a:r>
+            <a:r>
+              <a:rPr lang="fr-FR" b="1"/>
+              <a:t>sous problème</a:t>
+            </a:r>
+            <a:r>
+              <a:rPr lang="fr-FR" dirty="0"/>
+              <a:t> rencontré. Cette table lui permet de ne pas effectuer plusieurs fois les mêmes calculs ( ou sous problèmes ) et de gagner un temps considérable par rapport à une approche naïve.</a:t>
+            </a:r>
+          </a:p>
+        </p:txBody>
+      </p:sp>
+      <p:pic>
+        <p:nvPicPr>
+          <p:cNvPr id="4" name="Image 3">
+            <a:extLst>
+              <a:ext uri="{FF2B5EF4-FFF2-40B4-BE49-F238E27FC236}">
+                <a16:creationId xmlns:a16="http://schemas.microsoft.com/office/drawing/2014/main" id="{9F3F315E-9FCF-C941-A3C2-92956015EFB1}"/>
+              </a:ext>
+            </a:extLst>
+          </p:cNvPr>
+          <p:cNvPicPr>
+            <a:picLocks noChangeAspect="1"/>
+          </p:cNvPicPr>
+          <p:nvPr/>
+        </p:nvPicPr>
+        <p:blipFill>
+          <a:blip r:embed="rId2"/>
+          <a:stretch>
+            <a:fillRect/>
+          </a:stretch>
+        </p:blipFill>
+        <p:spPr>
+          <a:xfrm>
+            <a:off x="6709533" y="2639952"/>
+            <a:ext cx="5277100" cy="3153066"/>
+          </a:xfrm>
+          <a:prstGeom prst="rect">
+            <a:avLst/>
+          </a:prstGeom>
+        </p:spPr>
+      </p:pic>
+      <p:sp>
+        <p:nvSpPr>
+          <p:cNvPr id="5" name="ZoneTexte 4">
+            <a:extLst>
+              <a:ext uri="{FF2B5EF4-FFF2-40B4-BE49-F238E27FC236}">
+                <a16:creationId xmlns:a16="http://schemas.microsoft.com/office/drawing/2014/main" id="{6FEB274F-8783-7740-892C-B0F439E21445}"/>
+              </a:ext>
+            </a:extLst>
+          </p:cNvPr>
+          <p:cNvSpPr txBox="1"/>
+          <p:nvPr/>
+        </p:nvSpPr>
+        <p:spPr>
+          <a:xfrm>
+            <a:off x="8316390" y="5771511"/>
+            <a:ext cx="2063385" cy="369332"/>
+          </a:xfrm>
+          <a:prstGeom prst="rect">
+            <a:avLst/>
+          </a:prstGeom>
+          <a:noFill/>
+        </p:spPr>
+        <p:txBody>
+          <a:bodyPr wrap="none" rtlCol="0">
+            <a:spAutoFit/>
+          </a:bodyPr>
+          <a:lstStyle/>
+          <a:p>
+            <a:r>
+              <a:rPr lang="fr-FR" dirty="0"/>
+              <a:t>Matrice de calcule </a:t>
+            </a:r>
+          </a:p>
+        </p:txBody>
+      </p:sp>
+    </p:spTree>
+    <p:extLst>
+      <p:ext uri="{BB962C8B-B14F-4D97-AF65-F5344CB8AC3E}">
+        <p14:creationId xmlns:p14="http://schemas.microsoft.com/office/powerpoint/2010/main" val="3586406184"/>
+      </p:ext>
+    </p:extLst>
+  </p:cSld>
+  <p:clrMapOvr>
+    <a:masterClrMapping/>
+  </p:clrMapOvr>
+</p:sld>
+</file>
+
+<file path=ppt/slides/slide9.xml><?xml version="1.0" encoding="utf-8"?>
+<p:sld xmlns:a="http://schemas.openxmlformats.org/drawingml/2006/main" xmlns:r="http://schemas.openxmlformats.org/officeDocument/2006/relationships" xmlns:p="http://schemas.openxmlformats.org/presentationml/2006/main">
+  <p:cSld>
+    <p:bg>
+      <p:bgPr>
+        <a:solidFill>
+          <a:schemeClr val="bg2"/>
+        </a:solidFill>
+        <a:effectLst/>
+      </p:bgPr>
+    </p:bg>
+    <p:spTree>
+      <p:nvGrpSpPr>
+        <p:cNvPr id="1" name=""/>
+        <p:cNvGrpSpPr/>
+        <p:nvPr/>
+      </p:nvGrpSpPr>
+      <p:grpSpPr>
+        <a:xfrm>
+          <a:off x="0" y="0"/>
+          <a:ext cx="0" cy="0"/>
+          <a:chOff x="0" y="0"/>
+          <a:chExt cx="0" cy="0"/>
+        </a:xfrm>
+      </p:grpSpPr>
+      <p:sp useBgFill="1">
+        <p:nvSpPr>
+          <p:cNvPr id="8" name="Rectangle 7">
+            <a:extLst>
+              <a:ext uri="{FF2B5EF4-FFF2-40B4-BE49-F238E27FC236}">
+                <a16:creationId xmlns:a16="http://schemas.microsoft.com/office/drawing/2014/main" id="{70FF25AD-0F94-41DA-B0CB-8FDC642B706A}"/>
+              </a:ext>
+              <a:ext uri="{C183D7F6-B498-43B3-948B-1728B52AA6E4}">
+                <adec:decorative xmlns:adec="http://schemas.microsoft.com/office/drawing/2017/decorative" val="1"/>
+              </a:ext>
+            </a:extLst>
+          </p:cNvPr>
+          <p:cNvSpPr>
+            <a:spLocks noGrp="1" noRot="1" noChangeAspect="1" noMove="1" noResize="1" noEditPoints="1" noAdjustHandles="1" noChangeArrowheads="1" noChangeShapeType="1" noTextEdit="1"/>
+          </p:cNvSpPr>
+          <p:nvPr>
+            <p:extLst>
+              <p:ext uri="{386F3935-93C4-4BCD-93E2-E3B085C9AB24}">
+                <p16:designElem xmlns:p16="http://schemas.microsoft.com/office/powerpoint/2015/main" val="1"/>
+              </p:ext>
+            </p:extLst>
+          </p:nvPr>
+        </p:nvSpPr>
+        <p:spPr>
+          <a:xfrm>
+            <a:off x="0" y="0"/>
+            <a:ext cx="12192000" cy="6858000"/>
+          </a:xfrm>
+          <a:prstGeom prst="rect">
+            <a:avLst/>
+          </a:prstGeom>
+          <a:ln w="12700" cap="flat" cmpd="sng" algn="ctr">
+            <a:noFill/>
+            <a:prstDash val="solid"/>
+            <a:miter lim="800000"/>
+          </a:ln>
+          <a:effectLst/>
+          <a:extLst>
+            <a:ext uri="{91240B29-F687-4F45-9708-019B960494DF}">
+              <a14:hiddenLine xmlns:a14="http://schemas.microsoft.com/office/drawing/2010/main" w="12700" cap="flat" cmpd="sng" algn="ctr">
+                <a:solidFill>
+                  <a:schemeClr val="accent1">
+                    <a:shade val="50000"/>
+                  </a:schemeClr>
+                </a:solidFill>
+                <a:prstDash val="solid"/>
+                <a:miter lim="800000"/>
+              </a14:hiddenLine>
+            </a:ext>
+          </a:extLst>
+        </p:spPr>
+        <p:style>
+          <a:lnRef idx="2">
+            <a:schemeClr val="accent1">
+              <a:shade val="50000"/>
+            </a:schemeClr>
+          </a:lnRef>
+          <a:fillRef idx="1">
+            <a:schemeClr val="accent1"/>
+          </a:fillRef>
+          <a:effectRef idx="0">
+            <a:schemeClr val="accent1"/>
+          </a:effectRef>
+          <a:fontRef idx="minor">
+            <a:schemeClr val="lt1"/>
+          </a:fontRef>
+        </p:style>
+        <p:txBody>
+          <a:bodyPr rtlCol="0" anchor="ctr"/>
+          <a:lstStyle/>
+          <a:p>
+            <a:pPr algn="ctr"/>
+            <a:endParaRPr lang="en-US"/>
+          </a:p>
+        </p:txBody>
+      </p:sp>
+      <p:sp>
+        <p:nvSpPr>
+          <p:cNvPr id="10" name="Rectangle 9">
+            <a:extLst>
+              <a:ext uri="{FF2B5EF4-FFF2-40B4-BE49-F238E27FC236}">
+                <a16:creationId xmlns:a16="http://schemas.microsoft.com/office/drawing/2014/main" id="{D914EEE2-91CA-464B-AC64-5479DB51338C}"/>
+              </a:ext>
+              <a:ext uri="{C183D7F6-B498-43B3-948B-1728B52AA6E4}">
+                <adec:decorative xmlns:adec="http://schemas.microsoft.com/office/drawing/2017/decorative" val="1"/>
+              </a:ext>
+            </a:extLst>
+          </p:cNvPr>
+          <p:cNvSpPr>
+            <a:spLocks noGrp="1" noRot="1" noChangeAspect="1" noMove="1" noResize="1" noEditPoints="1" noAdjustHandles="1" noChangeArrowheads="1" noChangeShapeType="1" noTextEdit="1"/>
+          </p:cNvSpPr>
+          <p:nvPr>
+            <p:extLst>
+              <p:ext uri="{386F3935-93C4-4BCD-93E2-E3B085C9AB24}">
+                <p16:designElem xmlns:p16="http://schemas.microsoft.com/office/powerpoint/2015/main" val="1"/>
+              </p:ext>
+            </p:extLst>
+          </p:nvPr>
+        </p:nvSpPr>
+        <p:spPr>
+          <a:xfrm>
+            <a:off x="0" y="0"/>
+            <a:ext cx="12192000" cy="2128964"/>
+          </a:xfrm>
+          <a:prstGeom prst="rect">
+            <a:avLst/>
+          </a:prstGeom>
+          <a:solidFill>
+            <a:schemeClr val="accent2"/>
+          </a:solidFill>
+          <a:ln>
+            <a:noFill/>
+          </a:ln>
+        </p:spPr>
+        <p:style>
+          <a:lnRef idx="2">
+            <a:schemeClr val="accent1">
+              <a:shade val="50000"/>
+            </a:schemeClr>
+          </a:lnRef>
+          <a:fillRef idx="1">
+            <a:schemeClr val="accent1"/>
+          </a:fillRef>
+          <a:effectRef idx="0">
+            <a:schemeClr val="accent1"/>
+          </a:effectRef>
+          <a:fontRef idx="minor">
+            <a:schemeClr val="lt1"/>
+          </a:fontRef>
+        </p:style>
+        <p:txBody>
+          <a:bodyPr rtlCol="0" anchor="ctr"/>
+          <a:lstStyle/>
+          <a:p>
+            <a:pPr algn="ctr"/>
+            <a:endParaRPr lang="en-US"/>
+          </a:p>
+        </p:txBody>
+      </p:sp>
+      <p:sp>
+        <p:nvSpPr>
+          <p:cNvPr id="12" name="Freeform: Shape 11">
+            <a:extLst>
+              <a:ext uri="{FF2B5EF4-FFF2-40B4-BE49-F238E27FC236}">
+                <a16:creationId xmlns:a16="http://schemas.microsoft.com/office/drawing/2014/main" id="{6850C165-81F9-4CBC-87CA-3E6EBEA63901}"/>
+              </a:ext>
+              <a:ext uri="{C183D7F6-B498-43B3-948B-1728B52AA6E4}">
+                <adec:decorative xmlns:adec="http://schemas.microsoft.com/office/drawing/2017/decorative" val="1"/>
+              </a:ext>
+            </a:extLst>
+          </p:cNvPr>
+          <p:cNvSpPr>
+            <a:spLocks noGrp="1" noRot="1" noChangeAspect="1" noMove="1" noResize="1" noEditPoints="1" noAdjustHandles="1" noChangeArrowheads="1" noChangeShapeType="1" noTextEdit="1"/>
+          </p:cNvSpPr>
+          <p:nvPr>
+            <p:extLst>
+              <p:ext uri="{386F3935-93C4-4BCD-93E2-E3B085C9AB24}">
+                <p16:designElem xmlns:p16="http://schemas.microsoft.com/office/powerpoint/2015/main" val="1"/>
+              </p:ext>
+            </p:extLst>
+          </p:nvPr>
+        </p:nvSpPr>
+        <p:spPr>
+          <a:xfrm rot="10800000" flipV="1">
+            <a:off x="9860295" y="0"/>
+            <a:ext cx="2343647" cy="4385568"/>
+          </a:xfrm>
+          <a:custGeom>
+            <a:avLst/>
+            <a:gdLst>
+              <a:gd name="connsiteX0" fmla="*/ 0 w 2343647"/>
+              <a:gd name="connsiteY0" fmla="*/ 0 h 4385568"/>
+              <a:gd name="connsiteX1" fmla="*/ 13818 w 2343647"/>
+              <a:gd name="connsiteY1" fmla="*/ 0 h 4385568"/>
+              <a:gd name="connsiteX2" fmla="*/ 34560 w 2343647"/>
+              <a:gd name="connsiteY2" fmla="*/ 141658 h 4385568"/>
+              <a:gd name="connsiteX3" fmla="*/ 2208831 w 2343647"/>
+              <a:gd name="connsiteY3" fmla="*/ 2118828 h 4385568"/>
+              <a:gd name="connsiteX4" fmla="*/ 2343647 w 2343647"/>
+              <a:gd name="connsiteY4" fmla="*/ 2125211 h 4385568"/>
+              <a:gd name="connsiteX5" fmla="*/ 2208831 w 2343647"/>
+              <a:gd name="connsiteY5" fmla="*/ 2131594 h 4385568"/>
+              <a:gd name="connsiteX6" fmla="*/ 3143 w 2343647"/>
+              <a:gd name="connsiteY6" fmla="*/ 4323325 h 4385568"/>
+              <a:gd name="connsiteX7" fmla="*/ 0 w 2343647"/>
+              <a:gd name="connsiteY7" fmla="*/ 4385568 h 4385568"/>
+            </a:gdLst>
+            <a:ahLst/>
+            <a:cxnLst>
+              <a:cxn ang="0">
+                <a:pos x="connsiteX0" y="connsiteY0"/>
+              </a:cxn>
+              <a:cxn ang="0">
+                <a:pos x="connsiteX1" y="connsiteY1"/>
+              </a:cxn>
+              <a:cxn ang="0">
+                <a:pos x="connsiteX2" y="connsiteY2"/>
+              </a:cxn>
+              <a:cxn ang="0">
+                <a:pos x="connsiteX3" y="connsiteY3"/>
+              </a:cxn>
+              <a:cxn ang="0">
+                <a:pos x="connsiteX4" y="connsiteY4"/>
+              </a:cxn>
+              <a:cxn ang="0">
+                <a:pos x="connsiteX5" y="connsiteY5"/>
+              </a:cxn>
+              <a:cxn ang="0">
+                <a:pos x="connsiteX6" y="connsiteY6"/>
+              </a:cxn>
+              <a:cxn ang="0">
+                <a:pos x="connsiteX7" y="connsiteY7"/>
+              </a:cxn>
+            </a:cxnLst>
+            <a:rect l="l" t="t" r="r" b="b"/>
+            <a:pathLst>
+              <a:path w="2343647" h="4385568">
+                <a:moveTo>
+                  <a:pt x="0" y="0"/>
+                </a:moveTo>
+                <a:lnTo>
+                  <a:pt x="13818" y="0"/>
+                </a:lnTo>
+                <a:lnTo>
+                  <a:pt x="34560" y="141658"/>
+                </a:lnTo>
+                <a:cubicBezTo>
+                  <a:pt x="237593" y="1199063"/>
+                  <a:pt x="1119361" y="2015131"/>
+                  <a:pt x="2208831" y="2118828"/>
+                </a:cubicBezTo>
+                <a:lnTo>
+                  <a:pt x="2343647" y="2125211"/>
+                </a:lnTo>
+                <a:lnTo>
+                  <a:pt x="2208831" y="2131594"/>
+                </a:lnTo>
+                <a:cubicBezTo>
+                  <a:pt x="1046730" y="2242204"/>
+                  <a:pt x="120947" y="3163335"/>
+                  <a:pt x="3143" y="4323325"/>
+                </a:cubicBezTo>
+                <a:lnTo>
+                  <a:pt x="0" y="4385568"/>
+                </a:lnTo>
+                <a:close/>
+              </a:path>
+            </a:pathLst>
+          </a:custGeom>
+          <a:solidFill>
+            <a:schemeClr val="accent2"/>
+          </a:solidFill>
+          <a:ln>
+            <a:noFill/>
+          </a:ln>
+        </p:spPr>
+        <p:style>
+          <a:lnRef idx="2">
+            <a:schemeClr val="accent1">
+              <a:shade val="50000"/>
+            </a:schemeClr>
+          </a:lnRef>
+          <a:fillRef idx="1">
+            <a:schemeClr val="accent1"/>
+          </a:fillRef>
+          <a:effectRef idx="0">
+            <a:schemeClr val="accent1"/>
+          </a:effectRef>
+          <a:fontRef idx="minor">
+            <a:schemeClr val="lt1"/>
+          </a:fontRef>
+        </p:style>
+        <p:txBody>
+          <a:bodyPr wrap="square" rtlCol="0" anchor="ctr">
+            <a:noAutofit/>
+          </a:bodyPr>
+          <a:lstStyle/>
+          <a:p>
+            <a:pPr algn="ctr"/>
+            <a:endParaRPr lang="en-US"/>
+          </a:p>
+        </p:txBody>
+      </p:sp>
+      <p:sp>
+        <p:nvSpPr>
+          <p:cNvPr id="14" name="Freeform: Shape 13">
+            <a:extLst>
+              <a:ext uri="{FF2B5EF4-FFF2-40B4-BE49-F238E27FC236}">
+                <a16:creationId xmlns:a16="http://schemas.microsoft.com/office/drawing/2014/main" id="{5C1A212B-431A-4929-AA76-34A688D359DD}"/>
+              </a:ext>
+              <a:ext uri="{C183D7F6-B498-43B3-948B-1728B52AA6E4}">
+                <adec:decorative xmlns:adec="http://schemas.microsoft.com/office/drawing/2017/decorative" val="1"/>
+              </a:ext>
+            </a:extLst>
+          </p:cNvPr>
+          <p:cNvSpPr>
+            <a:spLocks noGrp="1" noRot="1" noChangeAspect="1" noMove="1" noResize="1" noEditPoints="1" noAdjustHandles="1" noChangeArrowheads="1" noChangeShapeType="1" noTextEdit="1"/>
+          </p:cNvSpPr>
+          <p:nvPr>
+            <p:extLst>
+              <p:ext uri="{386F3935-93C4-4BCD-93E2-E3B085C9AB24}">
+                <p16:designElem xmlns:p16="http://schemas.microsoft.com/office/powerpoint/2015/main" val="1"/>
+              </p:ext>
+            </p:extLst>
+          </p:nvPr>
+        </p:nvSpPr>
+        <p:spPr>
+          <a:xfrm rot="10800000" flipV="1">
+            <a:off x="9860295" y="0"/>
+            <a:ext cx="2343647" cy="4385568"/>
+          </a:xfrm>
+          <a:custGeom>
+            <a:avLst/>
+            <a:gdLst>
+              <a:gd name="connsiteX0" fmla="*/ 0 w 2343647"/>
+              <a:gd name="connsiteY0" fmla="*/ 0 h 4385568"/>
+              <a:gd name="connsiteX1" fmla="*/ 13818 w 2343647"/>
+              <a:gd name="connsiteY1" fmla="*/ 0 h 4385568"/>
+              <a:gd name="connsiteX2" fmla="*/ 34560 w 2343647"/>
+              <a:gd name="connsiteY2" fmla="*/ 141658 h 4385568"/>
+              <a:gd name="connsiteX3" fmla="*/ 2208831 w 2343647"/>
+              <a:gd name="connsiteY3" fmla="*/ 2118828 h 4385568"/>
+              <a:gd name="connsiteX4" fmla="*/ 2343647 w 2343647"/>
+              <a:gd name="connsiteY4" fmla="*/ 2125211 h 4385568"/>
+              <a:gd name="connsiteX5" fmla="*/ 2208831 w 2343647"/>
+              <a:gd name="connsiteY5" fmla="*/ 2131594 h 4385568"/>
+              <a:gd name="connsiteX6" fmla="*/ 3143 w 2343647"/>
+              <a:gd name="connsiteY6" fmla="*/ 4323325 h 4385568"/>
+              <a:gd name="connsiteX7" fmla="*/ 0 w 2343647"/>
+              <a:gd name="connsiteY7" fmla="*/ 4385568 h 4385568"/>
+            </a:gdLst>
+            <a:ahLst/>
+            <a:cxnLst>
+              <a:cxn ang="0">
+                <a:pos x="connsiteX0" y="connsiteY0"/>
+              </a:cxn>
+              <a:cxn ang="0">
+                <a:pos x="connsiteX1" y="connsiteY1"/>
+              </a:cxn>
+              <a:cxn ang="0">
+                <a:pos x="connsiteX2" y="connsiteY2"/>
+              </a:cxn>
+              <a:cxn ang="0">
+                <a:pos x="connsiteX3" y="connsiteY3"/>
+              </a:cxn>
+              <a:cxn ang="0">
+                <a:pos x="connsiteX4" y="connsiteY4"/>
+              </a:cxn>
+              <a:cxn ang="0">
+                <a:pos x="connsiteX5" y="connsiteY5"/>
+              </a:cxn>
+              <a:cxn ang="0">
+                <a:pos x="connsiteX6" y="connsiteY6"/>
+              </a:cxn>
+              <a:cxn ang="0">
+                <a:pos x="connsiteX7" y="connsiteY7"/>
+              </a:cxn>
+            </a:cxnLst>
+            <a:rect l="l" t="t" r="r" b="b"/>
+            <a:pathLst>
+              <a:path w="2343647" h="4385568">
+                <a:moveTo>
+                  <a:pt x="0" y="0"/>
+                </a:moveTo>
+                <a:lnTo>
+                  <a:pt x="13818" y="0"/>
+                </a:lnTo>
+                <a:lnTo>
+                  <a:pt x="34560" y="141658"/>
+                </a:lnTo>
+                <a:cubicBezTo>
+                  <a:pt x="237593" y="1199063"/>
+                  <a:pt x="1119361" y="2015131"/>
+                  <a:pt x="2208831" y="2118828"/>
+                </a:cubicBezTo>
+                <a:lnTo>
+                  <a:pt x="2343647" y="2125211"/>
+                </a:lnTo>
+                <a:lnTo>
+                  <a:pt x="2208831" y="2131594"/>
+                </a:lnTo>
+                <a:cubicBezTo>
+                  <a:pt x="1046730" y="2242204"/>
+                  <a:pt x="120947" y="3163335"/>
+                  <a:pt x="3143" y="4323325"/>
+                </a:cubicBezTo>
+                <a:lnTo>
+                  <a:pt x="0" y="4385568"/>
+                </a:lnTo>
+                <a:close/>
+              </a:path>
+            </a:pathLst>
+          </a:custGeom>
+          <a:solidFill>
+            <a:schemeClr val="accent2">
+              <a:lumMod val="75000"/>
+              <a:alpha val="70000"/>
+            </a:schemeClr>
+          </a:solidFill>
+          <a:ln>
+            <a:noFill/>
+          </a:ln>
+        </p:spPr>
+        <p:style>
+          <a:lnRef idx="2">
+            <a:schemeClr val="accent1">
+              <a:shade val="50000"/>
+            </a:schemeClr>
+          </a:lnRef>
+          <a:fillRef idx="1">
+            <a:schemeClr val="accent1"/>
+          </a:fillRef>
+          <a:effectRef idx="0">
+            <a:schemeClr val="accent1"/>
+          </a:effectRef>
+          <a:fontRef idx="minor">
+            <a:schemeClr val="lt1"/>
+          </a:fontRef>
+        </p:style>
+        <p:txBody>
+          <a:bodyPr wrap="square" rtlCol="0" anchor="ctr">
+            <a:noAutofit/>
+          </a:bodyPr>
+          <a:lstStyle/>
+          <a:p>
+            <a:pPr algn="ctr"/>
+            <a:endParaRPr lang="en-US"/>
+          </a:p>
+        </p:txBody>
+      </p:sp>
+      <p:sp>
+        <p:nvSpPr>
+          <p:cNvPr id="2" name="Titre 1">
+            <a:extLst>
+              <a:ext uri="{FF2B5EF4-FFF2-40B4-BE49-F238E27FC236}">
+                <a16:creationId xmlns:a16="http://schemas.microsoft.com/office/drawing/2014/main" id="{CA07F9A5-A685-D74D-9945-9CEE06F7FE22}"/>
+              </a:ext>
+            </a:extLst>
+          </p:cNvPr>
+          <p:cNvSpPr>
+            <a:spLocks noGrp="1"/>
+          </p:cNvSpPr>
+          <p:nvPr>
+            <p:ph type="title"/>
+          </p:nvPr>
+        </p:nvSpPr>
+        <p:spPr>
+          <a:xfrm>
+            <a:off x="914401" y="430307"/>
+            <a:ext cx="9914859" cy="1371600"/>
+          </a:xfrm>
+        </p:spPr>
+        <p:txBody>
+          <a:bodyPr>
+            <a:normAutofit/>
+          </a:bodyPr>
+          <a:lstStyle/>
+          <a:p>
+            <a:r>
+              <a:rPr lang="fr-FR" dirty="0" err="1">
+                <a:solidFill>
+                  <a:srgbClr val="FFFFFF"/>
+                </a:solidFill>
+              </a:rPr>
+              <a:t>Pseudo-code</a:t>
+            </a:r>
+            <a:r>
+              <a:rPr lang="fr-FR" dirty="0">
+                <a:solidFill>
+                  <a:srgbClr val="FFFFFF"/>
+                </a:solidFill>
+              </a:rPr>
+              <a:t> Algorithme optimisé</a:t>
+            </a:r>
+          </a:p>
+        </p:txBody>
+      </p:sp>
+      <p:sp>
+        <p:nvSpPr>
+          <p:cNvPr id="11" name="ZoneTexte 10">
+            <a:extLst>
+              <a:ext uri="{FF2B5EF4-FFF2-40B4-BE49-F238E27FC236}">
+                <a16:creationId xmlns:a16="http://schemas.microsoft.com/office/drawing/2014/main" id="{C896D0B0-BE18-934F-8B36-F9C63C5E393B}"/>
+              </a:ext>
+            </a:extLst>
+          </p:cNvPr>
+          <p:cNvSpPr txBox="1"/>
+          <p:nvPr/>
+        </p:nvSpPr>
+        <p:spPr>
+          <a:xfrm>
+            <a:off x="896137" y="2404430"/>
+            <a:ext cx="9029576" cy="3969481"/>
+          </a:xfrm>
+          <a:prstGeom prst="rect">
+            <a:avLst/>
+          </a:prstGeom>
+          <a:noFill/>
+        </p:spPr>
+        <p:txBody>
+          <a:bodyPr wrap="square" rtlCol="0">
+            <a:noAutofit/>
+          </a:bodyPr>
+          <a:lstStyle/>
+          <a:p>
+            <a:pPr marL="342900" indent="-342900">
+              <a:buFont typeface="Wingdings" pitchFamily="2" charset="2"/>
+              <a:buChar char="§"/>
+            </a:pPr>
+            <a:r>
+              <a:rPr lang="fr-FR" sz="2000" b="1" u="sng" dirty="0"/>
+              <a:t>Création d’une matrice pour recevoir le résultats des sous problèmes :</a:t>
+            </a:r>
+          </a:p>
+          <a:p>
+            <a:pPr marL="342900" indent="-342900">
+              <a:buFont typeface="Wingdings" pitchFamily="2" charset="2"/>
+              <a:buChar char="§"/>
+            </a:pPr>
+            <a:endParaRPr lang="fr-FR" sz="2000" b="1" u="sng" dirty="0"/>
+          </a:p>
+          <a:p>
+            <a:pPr marL="342900" indent="-342900">
+              <a:buFont typeface="Wingdings" pitchFamily="2" charset="2"/>
+              <a:buChar char="§"/>
+            </a:pPr>
+            <a:endParaRPr lang="fr-FR" sz="2000" dirty="0"/>
+          </a:p>
+          <a:p>
+            <a:pPr marL="342900" indent="-342900">
+              <a:buFont typeface="Wingdings" pitchFamily="2" charset="2"/>
+              <a:buChar char="§"/>
+            </a:pPr>
+            <a:endParaRPr lang="fr-FR" sz="2000" dirty="0"/>
+          </a:p>
+          <a:p>
+            <a:pPr marL="342900" indent="-342900">
+              <a:buFont typeface="Wingdings" pitchFamily="2" charset="2"/>
+              <a:buChar char="§"/>
+            </a:pPr>
+            <a:r>
+              <a:rPr lang="fr-FR" sz="2000" b="1" u="sng" dirty="0"/>
+              <a:t>Peuplement de la matrice en résolvant les sous problèmes :</a:t>
+            </a:r>
+          </a:p>
+        </p:txBody>
+      </p:sp>
+      <p:pic>
+        <p:nvPicPr>
+          <p:cNvPr id="13" name="Image 12">
+            <a:extLst>
+              <a:ext uri="{FF2B5EF4-FFF2-40B4-BE49-F238E27FC236}">
+                <a16:creationId xmlns:a16="http://schemas.microsoft.com/office/drawing/2014/main" id="{539E77B8-8C0E-7C40-A89A-CC1A27E440F4}"/>
+              </a:ext>
+            </a:extLst>
+          </p:cNvPr>
+          <p:cNvPicPr>
+            <a:picLocks noChangeAspect="1"/>
+          </p:cNvPicPr>
+          <p:nvPr/>
+        </p:nvPicPr>
+        <p:blipFill>
+          <a:blip r:embed="rId2"/>
+          <a:stretch>
+            <a:fillRect/>
+          </a:stretch>
+        </p:blipFill>
+        <p:spPr>
+          <a:xfrm>
+            <a:off x="1569282" y="2853203"/>
+            <a:ext cx="8605096" cy="655355"/>
+          </a:xfrm>
+          <a:prstGeom prst="rect">
+            <a:avLst/>
+          </a:prstGeom>
+        </p:spPr>
+      </p:pic>
+      <p:pic>
+        <p:nvPicPr>
+          <p:cNvPr id="15" name="Image 14">
+            <a:extLst>
+              <a:ext uri="{FF2B5EF4-FFF2-40B4-BE49-F238E27FC236}">
+                <a16:creationId xmlns:a16="http://schemas.microsoft.com/office/drawing/2014/main" id="{13982327-8B85-A249-9471-7161918F3D81}"/>
+              </a:ext>
+            </a:extLst>
+          </p:cNvPr>
+          <p:cNvPicPr>
+            <a:picLocks noChangeAspect="1"/>
+          </p:cNvPicPr>
+          <p:nvPr/>
+        </p:nvPicPr>
+        <p:blipFill>
+          <a:blip r:embed="rId3"/>
+          <a:stretch>
+            <a:fillRect/>
+          </a:stretch>
+        </p:blipFill>
+        <p:spPr>
+          <a:xfrm>
+            <a:off x="914401" y="4365426"/>
+            <a:ext cx="10601708" cy="1770735"/>
+          </a:xfrm>
+          <a:prstGeom prst="rect">
+            <a:avLst/>
+          </a:prstGeom>
+        </p:spPr>
+      </p:pic>
+    </p:spTree>
+    <p:extLst>
+      <p:ext uri="{BB962C8B-B14F-4D97-AF65-F5344CB8AC3E}">
+        <p14:creationId xmlns:p14="http://schemas.microsoft.com/office/powerpoint/2010/main" val="1340652720"/>
       </p:ext>
     </p:extLst>
   </p:cSld>
@@ -4681,4 +8759,299 @@
     </a:ext>
   </a:extLst>
 </a:theme>
+</file>
+
+<file path=ppt/theme/theme2.xml><?xml version="1.0" encoding="utf-8"?>
+<a:theme xmlns:a="http://schemas.openxmlformats.org/drawingml/2006/main" name="Thème Office">
+  <a:themeElements>
+    <a:clrScheme name="Office">
+      <a:dk1>
+        <a:sysClr val="windowText" lastClr="000000"/>
+      </a:dk1>
+      <a:lt1>
+        <a:sysClr val="window" lastClr="FFFFFF"/>
+      </a:lt1>
+      <a:dk2>
+        <a:srgbClr val="44546A"/>
+      </a:dk2>
+      <a:lt2>
+        <a:srgbClr val="E7E6E6"/>
+      </a:lt2>
+      <a:accent1>
+        <a:srgbClr val="4472C4"/>
+      </a:accent1>
+      <a:accent2>
+        <a:srgbClr val="ED7D31"/>
+      </a:accent2>
+      <a:accent3>
+        <a:srgbClr val="A5A5A5"/>
+      </a:accent3>
+      <a:accent4>
+        <a:srgbClr val="FFC000"/>
+      </a:accent4>
+      <a:accent5>
+        <a:srgbClr val="5B9BD5"/>
+      </a:accent5>
+      <a:accent6>
+        <a:srgbClr val="70AD47"/>
+      </a:accent6>
+      <a:hlink>
+        <a:srgbClr val="0563C1"/>
+      </a:hlink>
+      <a:folHlink>
+        <a:srgbClr val="954F72"/>
+      </a:folHlink>
+    </a:clrScheme>
+    <a:fontScheme name="Office">
+      <a:majorFont>
+        <a:latin typeface="Calibri Light" panose="020F0302020204030204"/>
+        <a:ea typeface=""/>
+        <a:cs typeface=""/>
+        <a:font script="Jpan" typeface="游ゴシック Light"/>
+        <a:font script="Hang" typeface="맑은 고딕"/>
+        <a:font script="Hans" typeface="等线 Light"/>
+        <a:font script="Hant" typeface="新細明體"/>
+        <a:font script="Arab" typeface="Times New Roman"/>
+        <a:font script="Hebr" typeface="Times New Roman"/>
+        <a:font script="Thai" typeface="Angsana New"/>
+        <a:font script="Ethi" typeface="Nyala"/>
+        <a:font script="Beng" typeface="Vrinda"/>
+        <a:font script="Gujr" typeface="Shruti"/>
+        <a:font script="Khmr" typeface="MoolBoran"/>
+        <a:font script="Knda" typeface="Tunga"/>
+        <a:font script="Guru" typeface="Raavi"/>
+        <a:font script="Cans" typeface="Euphemia"/>
+        <a:font script="Cher" typeface="Plantagenet Cherokee"/>
+        <a:font script="Yiii" typeface="Microsoft Yi Baiti"/>
+        <a:font script="Tibt" typeface="Microsoft Himalaya"/>
+        <a:font script="Thaa" typeface="MV Boli"/>
+        <a:font script="Deva" typeface="Mangal"/>
+        <a:font script="Telu" typeface="Gautami"/>
+        <a:font script="Taml" typeface="Latha"/>
+        <a:font script="Syrc" typeface="Estrangelo Edessa"/>
+        <a:font script="Orya" typeface="Kalinga"/>
+        <a:font script="Mlym" typeface="Kartika"/>
+        <a:font script="Laoo" typeface="DokChampa"/>
+        <a:font script="Sinh" typeface="Iskoola Pota"/>
+        <a:font script="Mong" typeface="Mongolian Baiti"/>
+        <a:font script="Viet" typeface="Times New Roman"/>
+        <a:font script="Uigh" typeface="Microsoft Uighur"/>
+        <a:font script="Geor" typeface="Sylfaen"/>
+        <a:font script="Armn" typeface="Arial"/>
+        <a:font script="Bugi" typeface="Leelawadee UI"/>
+        <a:font script="Bopo" typeface="Microsoft JhengHei"/>
+        <a:font script="Java" typeface="Javanese Text"/>
+        <a:font script="Lisu" typeface="Segoe UI"/>
+        <a:font script="Mymr" typeface="Myanmar Text"/>
+        <a:font script="Nkoo" typeface="Ebrima"/>
+        <a:font script="Olck" typeface="Nirmala UI"/>
+        <a:font script="Osma" typeface="Ebrima"/>
+        <a:font script="Phag" typeface="Phagspa"/>
+        <a:font script="Syrn" typeface="Estrangelo Edessa"/>
+        <a:font script="Syrj" typeface="Estrangelo Edessa"/>
+        <a:font script="Syre" typeface="Estrangelo Edessa"/>
+        <a:font script="Sora" typeface="Nirmala UI"/>
+        <a:font script="Tale" typeface="Microsoft Tai Le"/>
+        <a:font script="Talu" typeface="Microsoft New Tai Lue"/>
+        <a:font script="Tfng" typeface="Ebrima"/>
+      </a:majorFont>
+      <a:minorFont>
+        <a:latin typeface="Calibri" panose="020F0502020204030204"/>
+        <a:ea typeface=""/>
+        <a:cs typeface=""/>
+        <a:font script="Jpan" typeface="游ゴシック"/>
+        <a:font script="Hang" typeface="맑은 고딕"/>
+        <a:font script="Hans" typeface="等线"/>
+        <a:font script="Hant" typeface="新細明體"/>
+        <a:font script="Arab" typeface="Arial"/>
+        <a:font script="Hebr" typeface="Arial"/>
+        <a:font script="Thai" typeface="Cordia New"/>
+        <a:font script="Ethi" typeface="Nyala"/>
+        <a:font script="Beng" typeface="Vrinda"/>
+        <a:font script="Gujr" typeface="Shruti"/>
+        <a:font script="Khmr" typeface="DaunPenh"/>
+        <a:font script="Knda" typeface="Tunga"/>
+        <a:font script="Guru" typeface="Raavi"/>
+        <a:font script="Cans" typeface="Euphemia"/>
+        <a:font script="Cher" typeface="Plantagenet Cherokee"/>
+        <a:font script="Yiii" typeface="Microsoft Yi Baiti"/>
+        <a:font script="Tibt" typeface="Microsoft Himalaya"/>
+        <a:font script="Thaa" typeface="MV Boli"/>
+        <a:font script="Deva" typeface="Mangal"/>
+        <a:font script="Telu" typeface="Gautami"/>
+        <a:font script="Taml" typeface="Latha"/>
+        <a:font script="Syrc" typeface="Estrangelo Edessa"/>
+        <a:font script="Orya" typeface="Kalinga"/>
+        <a:font script="Mlym" typeface="Kartika"/>
+        <a:font script="Laoo" typeface="DokChampa"/>
+        <a:font script="Sinh" typeface="Iskoola Pota"/>
+        <a:font script="Mong" typeface="Mongolian Baiti"/>
+        <a:font script="Viet" typeface="Arial"/>
+        <a:font script="Uigh" typeface="Microsoft Uighur"/>
+        <a:font script="Geor" typeface="Sylfaen"/>
+        <a:font script="Armn" typeface="Arial"/>
+        <a:font script="Bugi" typeface="Leelawadee UI"/>
+        <a:font script="Bopo" typeface="Microsoft JhengHei"/>
+        <a:font script="Java" typeface="Javanese Text"/>
+        <a:font script="Lisu" typeface="Segoe UI"/>
+        <a:font script="Mymr" typeface="Myanmar Text"/>
+        <a:font script="Nkoo" typeface="Ebrima"/>
+        <a:font script="Olck" typeface="Nirmala UI"/>
+        <a:font script="Osma" typeface="Ebrima"/>
+        <a:font script="Phag" typeface="Phagspa"/>
+        <a:font script="Syrn" typeface="Estrangelo Edessa"/>
+        <a:font script="Syrj" typeface="Estrangelo Edessa"/>
+        <a:font script="Syre" typeface="Estrangelo Edessa"/>
+        <a:font script="Sora" typeface="Nirmala UI"/>
+        <a:font script="Tale" typeface="Microsoft Tai Le"/>
+        <a:font script="Talu" typeface="Microsoft New Tai Lue"/>
+        <a:font script="Tfng" typeface="Ebrima"/>
+      </a:minorFont>
+    </a:fontScheme>
+    <a:fmtScheme name="Office">
+      <a:fillStyleLst>
+        <a:solidFill>
+          <a:schemeClr val="phClr"/>
+        </a:solidFill>
+        <a:gradFill rotWithShape="1">
+          <a:gsLst>
+            <a:gs pos="0">
+              <a:schemeClr val="phClr">
+                <a:lumMod val="110000"/>
+                <a:satMod val="105000"/>
+                <a:tint val="67000"/>
+              </a:schemeClr>
+            </a:gs>
+            <a:gs pos="50000">
+              <a:schemeClr val="phClr">
+                <a:lumMod val="105000"/>
+                <a:satMod val="103000"/>
+                <a:tint val="73000"/>
+              </a:schemeClr>
+            </a:gs>
+            <a:gs pos="100000">
+              <a:schemeClr val="phClr">
+                <a:lumMod val="105000"/>
+                <a:satMod val="109000"/>
+                <a:tint val="81000"/>
+              </a:schemeClr>
+            </a:gs>
+          </a:gsLst>
+          <a:lin ang="5400000" scaled="0"/>
+        </a:gradFill>
+        <a:gradFill rotWithShape="1">
+          <a:gsLst>
+            <a:gs pos="0">
+              <a:schemeClr val="phClr">
+                <a:satMod val="103000"/>
+                <a:lumMod val="102000"/>
+                <a:tint val="94000"/>
+              </a:schemeClr>
+            </a:gs>
+            <a:gs pos="50000">
+              <a:schemeClr val="phClr">
+                <a:satMod val="110000"/>
+                <a:lumMod val="100000"/>
+                <a:shade val="100000"/>
+              </a:schemeClr>
+            </a:gs>
+            <a:gs pos="100000">
+              <a:schemeClr val="phClr">
+                <a:lumMod val="99000"/>
+                <a:satMod val="120000"/>
+                <a:shade val="78000"/>
+              </a:schemeClr>
+            </a:gs>
+          </a:gsLst>
+          <a:lin ang="5400000" scaled="0"/>
+        </a:gradFill>
+      </a:fillStyleLst>
+      <a:lnStyleLst>
+        <a:ln w="6350" cap="flat" cmpd="sng" algn="ctr">
+          <a:solidFill>
+            <a:schemeClr val="phClr"/>
+          </a:solidFill>
+          <a:prstDash val="solid"/>
+          <a:miter lim="800000"/>
+        </a:ln>
+        <a:ln w="12700" cap="flat" cmpd="sng" algn="ctr">
+          <a:solidFill>
+            <a:schemeClr val="phClr"/>
+          </a:solidFill>
+          <a:prstDash val="solid"/>
+          <a:miter lim="800000"/>
+        </a:ln>
+        <a:ln w="19050" cap="flat" cmpd="sng" algn="ctr">
+          <a:solidFill>
+            <a:schemeClr val="phClr"/>
+          </a:solidFill>
+          <a:prstDash val="solid"/>
+          <a:miter lim="800000"/>
+        </a:ln>
+      </a:lnStyleLst>
+      <a:effectStyleLst>
+        <a:effectStyle>
+          <a:effectLst/>
+        </a:effectStyle>
+        <a:effectStyle>
+          <a:effectLst/>
+        </a:effectStyle>
+        <a:effectStyle>
+          <a:effectLst>
+            <a:outerShdw blurRad="57150" dist="19050" dir="5400000" algn="ctr" rotWithShape="0">
+              <a:srgbClr val="000000">
+                <a:alpha val="63000"/>
+              </a:srgbClr>
+            </a:outerShdw>
+          </a:effectLst>
+        </a:effectStyle>
+      </a:effectStyleLst>
+      <a:bgFillStyleLst>
+        <a:solidFill>
+          <a:schemeClr val="phClr"/>
+        </a:solidFill>
+        <a:solidFill>
+          <a:schemeClr val="phClr">
+            <a:tint val="95000"/>
+            <a:satMod val="170000"/>
+          </a:schemeClr>
+        </a:solidFill>
+        <a:gradFill rotWithShape="1">
+          <a:gsLst>
+            <a:gs pos="0">
+              <a:schemeClr val="phClr">
+                <a:tint val="93000"/>
+                <a:satMod val="150000"/>
+                <a:shade val="98000"/>
+                <a:lumMod val="102000"/>
+              </a:schemeClr>
+            </a:gs>
+            <a:gs pos="50000">
+              <a:schemeClr val="phClr">
+                <a:tint val="98000"/>
+                <a:satMod val="130000"/>
+                <a:shade val="90000"/>
+                <a:lumMod val="103000"/>
+              </a:schemeClr>
+            </a:gs>
+            <a:gs pos="100000">
+              <a:schemeClr val="phClr">
+                <a:shade val="63000"/>
+                <a:satMod val="120000"/>
+              </a:schemeClr>
+            </a:gs>
+          </a:gsLst>
+          <a:lin ang="5400000" scaled="0"/>
+        </a:gradFill>
+      </a:bgFillStyleLst>
+    </a:fmtScheme>
+  </a:themeElements>
+  <a:objectDefaults/>
+  <a:extraClrSchemeLst/>
+  <a:extLst>
+    <a:ext uri="{05A4C25C-085E-4340-85A3-A5531E510DB2}">
+      <thm15:themeFamily xmlns:thm15="http://schemas.microsoft.com/office/thememl/2012/main" name="Office Theme" id="{62F939B6-93AF-4DB8-9C6B-D6C7DFDC589F}" vid="{4A3C46E8-61CC-4603-A589-7422A47A8E4A}"/>
+    </a:ext>
+  </a:extLst>
+</a:theme>
 </file>
</xml_diff>